<commit_message>
pptx updated, photos for working algorith JFA
</commit_message>
<xml_diff>
--- a/predstavitev/Vornoievi_diagrami.pptx
+++ b/predstavitev/Vornoievi_diagrami.pptx
@@ -7,15 +7,20 @@
   <p:sldIdLst>
     <p:sldId id="256" r:id="rId2"/>
     <p:sldId id="258" r:id="rId3"/>
-    <p:sldId id="259" r:id="rId4"/>
-    <p:sldId id="260" r:id="rId5"/>
-    <p:sldId id="261" r:id="rId6"/>
-    <p:sldId id="262" r:id="rId7"/>
-    <p:sldId id="263" r:id="rId8"/>
-    <p:sldId id="264" r:id="rId9"/>
-    <p:sldId id="265" r:id="rId10"/>
-    <p:sldId id="266" r:id="rId11"/>
-    <p:sldId id="257" r:id="rId12"/>
+    <p:sldId id="271" r:id="rId4"/>
+    <p:sldId id="259" r:id="rId5"/>
+    <p:sldId id="267" r:id="rId6"/>
+    <p:sldId id="260" r:id="rId7"/>
+    <p:sldId id="269" r:id="rId8"/>
+    <p:sldId id="270" r:id="rId9"/>
+    <p:sldId id="268" r:id="rId10"/>
+    <p:sldId id="261" r:id="rId11"/>
+    <p:sldId id="262" r:id="rId12"/>
+    <p:sldId id="263" r:id="rId13"/>
+    <p:sldId id="264" r:id="rId14"/>
+    <p:sldId id="265" r:id="rId15"/>
+    <p:sldId id="266" r:id="rId16"/>
+    <p:sldId id="257" r:id="rId17"/>
   </p:sldIdLst>
   <p:sldSz cx="12192000" cy="6858000"/>
   <p:notesSz cx="6858000" cy="9144000"/>
@@ -120,6 +125,18 @@
     </p:ext>
   </p:extLst>
 </p:presentation>
+</file>
+
+<file path=ppt/commentAuthors.xml><?xml version="1.0" encoding="utf-8"?>
+<p:cmAuthorLst xmlns:a="http://schemas.openxmlformats.org/drawingml/2006/main" xmlns:r="http://schemas.openxmlformats.org/officeDocument/2006/relationships" xmlns:p="http://schemas.openxmlformats.org/presentationml/2006/main">
+  <p:cmAuthor id="1" name="gal zakrajsek" initials="gz" lastIdx="1" clrIdx="0">
+    <p:extLst>
+      <p:ext uri="{19B8F6BF-5375-455C-9EA6-DF929625EA0E}">
+        <p15:presenceInfo xmlns:p15="http://schemas.microsoft.com/office/powerpoint/2012/main" userId="48d76dc3bcf44064" providerId="Windows Live"/>
+      </p:ext>
+    </p:extLst>
+  </p:cmAuthor>
+</p:cmAuthorLst>
 </file>
 
 <file path=ppt/slideLayouts/slideLayout1.xml><?xml version="1.0" encoding="utf-8"?>
@@ -3485,7 +3502,7 @@
           <p:cNvPr id="2" name="Title 1">
             <a:extLst>
               <a:ext uri="{FF2B5EF4-FFF2-40B4-BE49-F238E27FC236}">
-                <a16:creationId xmlns:a16="http://schemas.microsoft.com/office/drawing/2014/main" id="{98F35D36-9EDF-4969-AE71-F54118B67301}"/>
+                <a16:creationId xmlns:a16="http://schemas.microsoft.com/office/drawing/2014/main" id="{124CFA49-2ED5-4352-AAE2-97E150B8F05F}"/>
               </a:ext>
             </a:extLst>
           </p:cNvPr>
@@ -3503,7 +3520,7 @@
           <a:p>
             <a:r>
               <a:rPr lang="en-GB" dirty="0" err="1"/>
-              <a:t>Primeri</a:t>
+              <a:t>Delaunajeva</a:t>
             </a:r>
             <a:r>
               <a:rPr lang="en-GB" dirty="0"/>
@@ -3511,7 +3528,7 @@
             </a:r>
             <a:r>
               <a:rPr lang="en-GB" dirty="0" err="1"/>
-              <a:t>uporabe</a:t>
+              <a:t>triangulacija</a:t>
             </a:r>
             <a:endParaRPr lang="en-GB" dirty="0"/>
           </a:p>
@@ -3522,7 +3539,7 @@
           <p:cNvPr id="3" name="Content Placeholder 2">
             <a:extLst>
               <a:ext uri="{FF2B5EF4-FFF2-40B4-BE49-F238E27FC236}">
-                <a16:creationId xmlns:a16="http://schemas.microsoft.com/office/drawing/2014/main" id="{D4DC19CD-A53D-4EF8-84FE-8B5E488EFC83}"/>
+                <a16:creationId xmlns:a16="http://schemas.microsoft.com/office/drawing/2014/main" id="{C1A98CC0-CB9E-489E-9978-A018E67BF16A}"/>
               </a:ext>
             </a:extLst>
           </p:cNvPr>
@@ -3538,7 +3555,689 @@
           <a:bodyPr/>
           <a:lstStyle/>
           <a:p>
+            <a:r>
+              <a:rPr lang="en-GB" dirty="0" err="1"/>
+              <a:t>Kaj</a:t>
+            </a:r>
+            <a:r>
+              <a:rPr lang="en-GB" dirty="0"/>
+              <a:t> je in </a:t>
+            </a:r>
+            <a:r>
+              <a:rPr lang="en-GB" dirty="0" err="1"/>
+              <a:t>ideja</a:t>
+            </a:r>
+            <a:endParaRPr lang="en-GB" dirty="0"/>
+          </a:p>
+        </p:txBody>
+      </p:sp>
+    </p:spTree>
+    <p:extLst>
+      <p:ext uri="{BB962C8B-B14F-4D97-AF65-F5344CB8AC3E}">
+        <p14:creationId xmlns:p14="http://schemas.microsoft.com/office/powerpoint/2010/main" val="214125740"/>
+      </p:ext>
+    </p:extLst>
+  </p:cSld>
+  <p:clrMapOvr>
+    <a:masterClrMapping/>
+  </p:clrMapOvr>
+</p:sld>
+</file>
+
+<file path=ppt/slides/slide11.xml><?xml version="1.0" encoding="utf-8"?>
+<p:sld xmlns:a="http://schemas.openxmlformats.org/drawingml/2006/main" xmlns:r="http://schemas.openxmlformats.org/officeDocument/2006/relationships" xmlns:p="http://schemas.openxmlformats.org/presentationml/2006/main">
+  <p:cSld>
+    <p:spTree>
+      <p:nvGrpSpPr>
+        <p:cNvPr id="1" name=""/>
+        <p:cNvGrpSpPr/>
+        <p:nvPr/>
+      </p:nvGrpSpPr>
+      <p:grpSpPr>
+        <a:xfrm>
+          <a:off x="0" y="0"/>
+          <a:ext cx="0" cy="0"/>
+          <a:chOff x="0" y="0"/>
+          <a:chExt cx="0" cy="0"/>
+        </a:xfrm>
+      </p:grpSpPr>
+      <p:sp>
+        <p:nvSpPr>
+          <p:cNvPr id="2" name="Title 1">
+            <a:extLst>
+              <a:ext uri="{FF2B5EF4-FFF2-40B4-BE49-F238E27FC236}">
+                <a16:creationId xmlns:a16="http://schemas.microsoft.com/office/drawing/2014/main" id="{BBFE05F7-F9CD-4E1E-BBD4-536CF4320A93}"/>
+              </a:ext>
+            </a:extLst>
+          </p:cNvPr>
+          <p:cNvSpPr>
+            <a:spLocks noGrp="1"/>
+          </p:cNvSpPr>
+          <p:nvPr>
+            <p:ph type="title"/>
+          </p:nvPr>
+        </p:nvSpPr>
+        <p:spPr/>
+        <p:txBody>
+          <a:bodyPr/>
+          <a:lstStyle/>
+          <a:p>
+            <a:r>
+              <a:rPr lang="en-GB" dirty="0" err="1"/>
+              <a:t>Delaunajeva</a:t>
+            </a:r>
+            <a:r>
+              <a:rPr lang="en-GB" dirty="0"/>
+              <a:t> </a:t>
+            </a:r>
+            <a:r>
+              <a:rPr lang="en-GB" dirty="0" err="1"/>
+              <a:t>triangulacija</a:t>
+            </a:r>
+            <a:endParaRPr lang="en-GB" dirty="0"/>
+          </a:p>
+        </p:txBody>
+      </p:sp>
+      <p:sp>
+        <p:nvSpPr>
+          <p:cNvPr id="3" name="Content Placeholder 2">
+            <a:extLst>
+              <a:ext uri="{FF2B5EF4-FFF2-40B4-BE49-F238E27FC236}">
+                <a16:creationId xmlns:a16="http://schemas.microsoft.com/office/drawing/2014/main" id="{7BAD4088-F99E-4ADC-A4D7-2E80DC233616}"/>
+              </a:ext>
+            </a:extLst>
+          </p:cNvPr>
+          <p:cNvSpPr>
+            <a:spLocks noGrp="1"/>
+          </p:cNvSpPr>
+          <p:nvPr>
+            <p:ph idx="1"/>
+          </p:nvPr>
+        </p:nvSpPr>
+        <p:spPr/>
+        <p:txBody>
+          <a:bodyPr/>
+          <a:lstStyle/>
+          <a:p>
+            <a:r>
+              <a:rPr lang="en-GB" dirty="0" err="1"/>
+              <a:t>Algoritem</a:t>
+            </a:r>
+            <a:endParaRPr lang="en-GB" dirty="0"/>
+          </a:p>
+        </p:txBody>
+      </p:sp>
+    </p:spTree>
+    <p:extLst>
+      <p:ext uri="{BB962C8B-B14F-4D97-AF65-F5344CB8AC3E}">
+        <p14:creationId xmlns:p14="http://schemas.microsoft.com/office/powerpoint/2010/main" val="2149885589"/>
+      </p:ext>
+    </p:extLst>
+  </p:cSld>
+  <p:clrMapOvr>
+    <a:masterClrMapping/>
+  </p:clrMapOvr>
+</p:sld>
+</file>
+
+<file path=ppt/slides/slide12.xml><?xml version="1.0" encoding="utf-8"?>
+<p:sld xmlns:a="http://schemas.openxmlformats.org/drawingml/2006/main" xmlns:r="http://schemas.openxmlformats.org/officeDocument/2006/relationships" xmlns:p="http://schemas.openxmlformats.org/presentationml/2006/main">
+  <p:cSld>
+    <p:spTree>
+      <p:nvGrpSpPr>
+        <p:cNvPr id="1" name=""/>
+        <p:cNvGrpSpPr/>
+        <p:nvPr/>
+      </p:nvGrpSpPr>
+      <p:grpSpPr>
+        <a:xfrm>
+          <a:off x="0" y="0"/>
+          <a:ext cx="0" cy="0"/>
+          <a:chOff x="0" y="0"/>
+          <a:chExt cx="0" cy="0"/>
+        </a:xfrm>
+      </p:grpSpPr>
+      <p:sp>
+        <p:nvSpPr>
+          <p:cNvPr id="2" name="Title 1">
+            <a:extLst>
+              <a:ext uri="{FF2B5EF4-FFF2-40B4-BE49-F238E27FC236}">
+                <a16:creationId xmlns:a16="http://schemas.microsoft.com/office/drawing/2014/main" id="{2A6D3955-70A8-4A0E-9265-F698F028F026}"/>
+              </a:ext>
+            </a:extLst>
+          </p:cNvPr>
+          <p:cNvSpPr>
+            <a:spLocks noGrp="1"/>
+          </p:cNvSpPr>
+          <p:nvPr>
+            <p:ph type="title"/>
+          </p:nvPr>
+        </p:nvSpPr>
+        <p:spPr/>
+        <p:txBody>
+          <a:bodyPr/>
+          <a:lstStyle/>
+          <a:p>
+            <a:r>
+              <a:rPr lang="en-GB" dirty="0" err="1"/>
+              <a:t>Delaunajeva</a:t>
+            </a:r>
+            <a:r>
+              <a:rPr lang="en-GB" dirty="0"/>
+              <a:t> </a:t>
+            </a:r>
+            <a:r>
+              <a:rPr lang="en-GB" dirty="0" err="1"/>
+              <a:t>triangulacija</a:t>
+            </a:r>
+            <a:endParaRPr lang="en-GB" dirty="0"/>
+          </a:p>
+        </p:txBody>
+      </p:sp>
+      <p:sp>
+        <p:nvSpPr>
+          <p:cNvPr id="3" name="Content Placeholder 2">
+            <a:extLst>
+              <a:ext uri="{FF2B5EF4-FFF2-40B4-BE49-F238E27FC236}">
+                <a16:creationId xmlns:a16="http://schemas.microsoft.com/office/drawing/2014/main" id="{C8B64E5B-109D-4C2B-984D-9569CEDE5709}"/>
+              </a:ext>
+            </a:extLst>
+          </p:cNvPr>
+          <p:cNvSpPr>
+            <a:spLocks noGrp="1"/>
+          </p:cNvSpPr>
+          <p:nvPr>
+            <p:ph idx="1"/>
+          </p:nvPr>
+        </p:nvSpPr>
+        <p:spPr/>
+        <p:txBody>
+          <a:bodyPr/>
+          <a:lstStyle/>
+          <a:p>
+            <a:r>
+              <a:rPr lang="en-GB" dirty="0" err="1"/>
+              <a:t>Algoritem</a:t>
+            </a:r>
+            <a:endParaRPr lang="en-GB" dirty="0"/>
+          </a:p>
+        </p:txBody>
+      </p:sp>
+    </p:spTree>
+    <p:extLst>
+      <p:ext uri="{BB962C8B-B14F-4D97-AF65-F5344CB8AC3E}">
+        <p14:creationId xmlns:p14="http://schemas.microsoft.com/office/powerpoint/2010/main" val="3273298054"/>
+      </p:ext>
+    </p:extLst>
+  </p:cSld>
+  <p:clrMapOvr>
+    <a:masterClrMapping/>
+  </p:clrMapOvr>
+</p:sld>
+</file>
+
+<file path=ppt/slides/slide13.xml><?xml version="1.0" encoding="utf-8"?>
+<p:sld xmlns:a="http://schemas.openxmlformats.org/drawingml/2006/main" xmlns:r="http://schemas.openxmlformats.org/officeDocument/2006/relationships" xmlns:p="http://schemas.openxmlformats.org/presentationml/2006/main">
+  <p:cSld>
+    <p:spTree>
+      <p:nvGrpSpPr>
+        <p:cNvPr id="1" name=""/>
+        <p:cNvGrpSpPr/>
+        <p:nvPr/>
+      </p:nvGrpSpPr>
+      <p:grpSpPr>
+        <a:xfrm>
+          <a:off x="0" y="0"/>
+          <a:ext cx="0" cy="0"/>
+          <a:chOff x="0" y="0"/>
+          <a:chExt cx="0" cy="0"/>
+        </a:xfrm>
+      </p:grpSpPr>
+      <p:sp>
+        <p:nvSpPr>
+          <p:cNvPr id="2" name="Title 1">
+            <a:extLst>
+              <a:ext uri="{FF2B5EF4-FFF2-40B4-BE49-F238E27FC236}">
+                <a16:creationId xmlns:a16="http://schemas.microsoft.com/office/drawing/2014/main" id="{A0EAE73B-6F8B-4BB8-A42B-92532DB8443D}"/>
+              </a:ext>
+            </a:extLst>
+          </p:cNvPr>
+          <p:cNvSpPr>
+            <a:spLocks noGrp="1"/>
+          </p:cNvSpPr>
+          <p:nvPr>
+            <p:ph type="title"/>
+          </p:nvPr>
+        </p:nvSpPr>
+        <p:spPr/>
+        <p:txBody>
+          <a:bodyPr/>
+          <a:lstStyle/>
+          <a:p>
+            <a:r>
+              <a:rPr lang="en-GB" dirty="0" err="1"/>
+              <a:t>Povezovanje</a:t>
+            </a:r>
+            <a:r>
+              <a:rPr lang="en-GB" dirty="0"/>
+              <a:t> </a:t>
+            </a:r>
+            <a:r>
+              <a:rPr lang="en-GB" dirty="0" err="1"/>
+              <a:t>točk</a:t>
+            </a:r>
+            <a:endParaRPr lang="en-GB" dirty="0"/>
+          </a:p>
+        </p:txBody>
+      </p:sp>
+      <p:sp>
+        <p:nvSpPr>
+          <p:cNvPr id="3" name="Content Placeholder 2">
+            <a:extLst>
+              <a:ext uri="{FF2B5EF4-FFF2-40B4-BE49-F238E27FC236}">
+                <a16:creationId xmlns:a16="http://schemas.microsoft.com/office/drawing/2014/main" id="{D45FCF20-91D5-47B4-82F1-712AD67B5261}"/>
+              </a:ext>
+            </a:extLst>
+          </p:cNvPr>
+          <p:cNvSpPr>
+            <a:spLocks noGrp="1"/>
+          </p:cNvSpPr>
+          <p:nvPr>
+            <p:ph idx="1"/>
+          </p:nvPr>
+        </p:nvSpPr>
+        <p:spPr/>
+        <p:txBody>
+          <a:bodyPr/>
+          <a:lstStyle/>
+          <a:p>
             <a:endParaRPr lang="en-GB"/>
+          </a:p>
+        </p:txBody>
+      </p:sp>
+    </p:spTree>
+    <p:extLst>
+      <p:ext uri="{BB962C8B-B14F-4D97-AF65-F5344CB8AC3E}">
+        <p14:creationId xmlns:p14="http://schemas.microsoft.com/office/powerpoint/2010/main" val="2975574081"/>
+      </p:ext>
+    </p:extLst>
+  </p:cSld>
+  <p:clrMapOvr>
+    <a:masterClrMapping/>
+  </p:clrMapOvr>
+</p:sld>
+</file>
+
+<file path=ppt/slides/slide14.xml><?xml version="1.0" encoding="utf-8"?>
+<p:sld xmlns:a="http://schemas.openxmlformats.org/drawingml/2006/main" xmlns:r="http://schemas.openxmlformats.org/officeDocument/2006/relationships" xmlns:p="http://schemas.openxmlformats.org/presentationml/2006/main">
+  <p:cSld>
+    <p:spTree>
+      <p:nvGrpSpPr>
+        <p:cNvPr id="1" name=""/>
+        <p:cNvGrpSpPr/>
+        <p:nvPr/>
+      </p:nvGrpSpPr>
+      <p:grpSpPr>
+        <a:xfrm>
+          <a:off x="0" y="0"/>
+          <a:ext cx="0" cy="0"/>
+          <a:chOff x="0" y="0"/>
+          <a:chExt cx="0" cy="0"/>
+        </a:xfrm>
+      </p:grpSpPr>
+      <p:sp>
+        <p:nvSpPr>
+          <p:cNvPr id="2" name="Title 1">
+            <a:extLst>
+              <a:ext uri="{FF2B5EF4-FFF2-40B4-BE49-F238E27FC236}">
+                <a16:creationId xmlns:a16="http://schemas.microsoft.com/office/drawing/2014/main" id="{AF637770-BFFA-499F-A743-11013ABC97EF}"/>
+              </a:ext>
+            </a:extLst>
+          </p:cNvPr>
+          <p:cNvSpPr>
+            <a:spLocks noGrp="1"/>
+          </p:cNvSpPr>
+          <p:nvPr>
+            <p:ph type="title"/>
+          </p:nvPr>
+        </p:nvSpPr>
+        <p:spPr/>
+        <p:txBody>
+          <a:bodyPr/>
+          <a:lstStyle/>
+          <a:p>
+            <a:r>
+              <a:rPr lang="en-GB" dirty="0" err="1"/>
+              <a:t>Primeri</a:t>
+            </a:r>
+            <a:r>
+              <a:rPr lang="en-GB" dirty="0"/>
+              <a:t> in </a:t>
+            </a:r>
+            <a:r>
+              <a:rPr lang="en-GB" dirty="0" err="1"/>
+              <a:t>zanimivosti</a:t>
+            </a:r>
+            <a:endParaRPr lang="en-GB" dirty="0"/>
+          </a:p>
+        </p:txBody>
+      </p:sp>
+      <p:sp>
+        <p:nvSpPr>
+          <p:cNvPr id="3" name="Content Placeholder 2">
+            <a:extLst>
+              <a:ext uri="{FF2B5EF4-FFF2-40B4-BE49-F238E27FC236}">
+                <a16:creationId xmlns:a16="http://schemas.microsoft.com/office/drawing/2014/main" id="{5306AC4C-D1DD-44AE-A954-698F27024FC7}"/>
+              </a:ext>
+            </a:extLst>
+          </p:cNvPr>
+          <p:cNvSpPr>
+            <a:spLocks noGrp="1"/>
+          </p:cNvSpPr>
+          <p:nvPr>
+            <p:ph idx="1"/>
+          </p:nvPr>
+        </p:nvSpPr>
+        <p:spPr/>
+        <p:txBody>
+          <a:bodyPr/>
+          <a:lstStyle/>
+          <a:p>
+            <a:endParaRPr lang="en-GB"/>
+          </a:p>
+        </p:txBody>
+      </p:sp>
+    </p:spTree>
+    <p:extLst>
+      <p:ext uri="{BB962C8B-B14F-4D97-AF65-F5344CB8AC3E}">
+        <p14:creationId xmlns:p14="http://schemas.microsoft.com/office/powerpoint/2010/main" val="3838925735"/>
+      </p:ext>
+    </p:extLst>
+  </p:cSld>
+  <p:clrMapOvr>
+    <a:masterClrMapping/>
+  </p:clrMapOvr>
+</p:sld>
+</file>
+
+<file path=ppt/slides/slide15.xml><?xml version="1.0" encoding="utf-8"?>
+<p:sld xmlns:a="http://schemas.openxmlformats.org/drawingml/2006/main" xmlns:r="http://schemas.openxmlformats.org/officeDocument/2006/relationships" xmlns:p="http://schemas.openxmlformats.org/presentationml/2006/main">
+  <p:cSld>
+    <p:spTree>
+      <p:nvGrpSpPr>
+        <p:cNvPr id="1" name=""/>
+        <p:cNvGrpSpPr/>
+        <p:nvPr/>
+      </p:nvGrpSpPr>
+      <p:grpSpPr>
+        <a:xfrm>
+          <a:off x="0" y="0"/>
+          <a:ext cx="0" cy="0"/>
+          <a:chOff x="0" y="0"/>
+          <a:chExt cx="0" cy="0"/>
+        </a:xfrm>
+      </p:grpSpPr>
+      <p:sp>
+        <p:nvSpPr>
+          <p:cNvPr id="2" name="Title 1">
+            <a:extLst>
+              <a:ext uri="{FF2B5EF4-FFF2-40B4-BE49-F238E27FC236}">
+                <a16:creationId xmlns:a16="http://schemas.microsoft.com/office/drawing/2014/main" id="{98F35D36-9EDF-4969-AE71-F54118B67301}"/>
+              </a:ext>
+            </a:extLst>
+          </p:cNvPr>
+          <p:cNvSpPr>
+            <a:spLocks noGrp="1"/>
+          </p:cNvSpPr>
+          <p:nvPr>
+            <p:ph type="title"/>
+          </p:nvPr>
+        </p:nvSpPr>
+        <p:spPr/>
+        <p:txBody>
+          <a:bodyPr/>
+          <a:lstStyle/>
+          <a:p>
+            <a:r>
+              <a:rPr lang="en-GB" dirty="0" err="1"/>
+              <a:t>Primeri</a:t>
+            </a:r>
+            <a:r>
+              <a:rPr lang="en-GB" dirty="0"/>
+              <a:t> </a:t>
+            </a:r>
+            <a:r>
+              <a:rPr lang="en-GB" dirty="0" err="1"/>
+              <a:t>uporabe</a:t>
+            </a:r>
+            <a:endParaRPr lang="en-GB" dirty="0"/>
+          </a:p>
+        </p:txBody>
+      </p:sp>
+      <p:sp>
+        <p:nvSpPr>
+          <p:cNvPr id="3" name="Content Placeholder 2">
+            <a:extLst>
+              <a:ext uri="{FF2B5EF4-FFF2-40B4-BE49-F238E27FC236}">
+                <a16:creationId xmlns:a16="http://schemas.microsoft.com/office/drawing/2014/main" id="{D4DC19CD-A53D-4EF8-84FE-8B5E488EFC83}"/>
+              </a:ext>
+            </a:extLst>
+          </p:cNvPr>
+          <p:cNvSpPr>
+            <a:spLocks noGrp="1"/>
+          </p:cNvSpPr>
+          <p:nvPr>
+            <p:ph idx="1"/>
+          </p:nvPr>
+        </p:nvSpPr>
+        <p:spPr/>
+        <p:txBody>
+          <a:bodyPr/>
+          <a:lstStyle/>
+          <a:p>
+            <a:r>
+              <a:rPr lang="en-GB" dirty="0" err="1"/>
+              <a:t>Načrtovanje</a:t>
+            </a:r>
+            <a:r>
+              <a:rPr lang="en-GB" dirty="0"/>
+              <a:t> </a:t>
+            </a:r>
+            <a:r>
+              <a:rPr lang="en-GB" dirty="0" err="1"/>
+              <a:t>rasti</a:t>
+            </a:r>
+            <a:r>
+              <a:rPr lang="en-GB" dirty="0"/>
+              <a:t> in </a:t>
+            </a:r>
+            <a:r>
+              <a:rPr lang="en-GB" dirty="0" err="1"/>
+              <a:t>razvoja</a:t>
+            </a:r>
+            <a:r>
+              <a:rPr lang="en-GB" dirty="0"/>
+              <a:t> </a:t>
+            </a:r>
+            <a:r>
+              <a:rPr lang="en-GB" dirty="0" err="1"/>
+              <a:t>gozdov</a:t>
+            </a:r>
+            <a:endParaRPr lang="en-GB" dirty="0"/>
+          </a:p>
+          <a:p>
+            <a:r>
+              <a:rPr lang="en-GB" dirty="0" err="1"/>
+              <a:t>Robotika</a:t>
+            </a:r>
+            <a:r>
+              <a:rPr lang="en-GB" dirty="0"/>
+              <a:t> (</a:t>
+            </a:r>
+            <a:r>
+              <a:rPr lang="en-GB" dirty="0" err="1"/>
+              <a:t>Načrtovanje</a:t>
+            </a:r>
+            <a:r>
+              <a:rPr lang="en-GB" dirty="0"/>
+              <a:t> </a:t>
+            </a:r>
+            <a:r>
+              <a:rPr lang="en-GB" dirty="0" err="1"/>
+              <a:t>poti</a:t>
+            </a:r>
+            <a:r>
+              <a:rPr lang="en-GB" dirty="0"/>
+              <a:t>)</a:t>
+            </a:r>
+          </a:p>
+          <a:p>
+            <a:r>
+              <a:rPr lang="en-GB" dirty="0" err="1"/>
+              <a:t>Najbližja</a:t>
+            </a:r>
+            <a:r>
+              <a:rPr lang="en-GB" dirty="0"/>
+              <a:t> </a:t>
+            </a:r>
+            <a:r>
+              <a:rPr lang="en-GB" dirty="0" err="1"/>
+              <a:t>pošta</a:t>
+            </a:r>
+            <a:r>
+              <a:rPr lang="en-GB" dirty="0"/>
+              <a:t>, </a:t>
+            </a:r>
+            <a:r>
+              <a:rPr lang="en-GB" dirty="0" err="1"/>
+              <a:t>bolnica</a:t>
+            </a:r>
+            <a:r>
+              <a:rPr lang="en-GB" dirty="0"/>
+              <a:t>, …</a:t>
+            </a:r>
+          </a:p>
+          <a:p>
+            <a:r>
+              <a:rPr lang="en-GB" dirty="0" err="1"/>
+              <a:t>Iskanje</a:t>
+            </a:r>
+            <a:r>
+              <a:rPr lang="en-GB" dirty="0"/>
+              <a:t> </a:t>
+            </a:r>
+            <a:r>
+              <a:rPr lang="en-GB" dirty="0" err="1"/>
+              <a:t>najbližjega</a:t>
+            </a:r>
+            <a:r>
+              <a:rPr lang="en-GB" dirty="0"/>
+              <a:t> </a:t>
+            </a:r>
+            <a:r>
+              <a:rPr lang="en-GB" dirty="0" err="1"/>
+              <a:t>telefonskega</a:t>
+            </a:r>
+            <a:r>
+              <a:rPr lang="en-GB" dirty="0"/>
+              <a:t> </a:t>
+            </a:r>
+            <a:r>
+              <a:rPr lang="en-GB" dirty="0" err="1"/>
+              <a:t>oddajnika</a:t>
+            </a:r>
+            <a:endParaRPr lang="en-GB" dirty="0"/>
+          </a:p>
+          <a:p>
+            <a:endParaRPr lang="en-GB" dirty="0"/>
+          </a:p>
+          <a:p>
+            <a:r>
+              <a:rPr lang="en-GB" dirty="0"/>
+              <a:t>Melbourne, </a:t>
+            </a:r>
+            <a:r>
+              <a:rPr lang="en-GB" dirty="0" err="1"/>
+              <a:t>šolarji</a:t>
+            </a:r>
+            <a:r>
+              <a:rPr lang="en-GB" dirty="0"/>
+              <a:t> </a:t>
+            </a:r>
+            <a:r>
+              <a:rPr lang="en-GB" dirty="0" err="1"/>
+              <a:t>samo</a:t>
+            </a:r>
+            <a:r>
+              <a:rPr lang="en-GB" dirty="0"/>
+              <a:t> v </a:t>
+            </a:r>
+            <a:r>
+              <a:rPr lang="en-GB" dirty="0" err="1"/>
+              <a:t>najbližjo</a:t>
+            </a:r>
+            <a:r>
+              <a:rPr lang="en-GB" dirty="0"/>
+              <a:t> </a:t>
+            </a:r>
+            <a:r>
+              <a:rPr lang="en-GB" dirty="0" err="1"/>
+              <a:t>šolo</a:t>
+            </a:r>
+            <a:r>
+              <a:rPr lang="en-GB" dirty="0"/>
+              <a:t> </a:t>
+            </a:r>
+            <a:r>
+              <a:rPr lang="en-GB" dirty="0" err="1"/>
+              <a:t>njihovim</a:t>
+            </a:r>
+            <a:r>
+              <a:rPr lang="en-GB" dirty="0"/>
+              <a:t> </a:t>
+            </a:r>
+            <a:r>
+              <a:rPr lang="en-GB" dirty="0" err="1"/>
+              <a:t>domom</a:t>
+            </a:r>
+            <a:r>
+              <a:rPr lang="en-GB" dirty="0"/>
+              <a:t>.</a:t>
+            </a:r>
+          </a:p>
+          <a:p>
+            <a:r>
+              <a:rPr lang="en-GB" dirty="0" err="1"/>
+              <a:t>Dinara</a:t>
+            </a:r>
+            <a:r>
+              <a:rPr lang="en-GB" dirty="0"/>
+              <a:t> </a:t>
+            </a:r>
+            <a:r>
+              <a:rPr lang="en-GB" dirty="0" err="1"/>
+              <a:t>Kasko</a:t>
+            </a:r>
+            <a:r>
+              <a:rPr lang="en-GB" dirty="0"/>
+              <a:t>, 3D </a:t>
+            </a:r>
+            <a:r>
+              <a:rPr lang="en-GB" dirty="0" err="1"/>
+              <a:t>printanje</a:t>
+            </a:r>
+            <a:r>
+              <a:rPr lang="en-GB" dirty="0"/>
+              <a:t> </a:t>
+            </a:r>
+            <a:r>
+              <a:rPr lang="en-GB" dirty="0" err="1"/>
+              <a:t>modelčkov</a:t>
+            </a:r>
+            <a:r>
+              <a:rPr lang="en-GB" dirty="0"/>
+              <a:t> za torte</a:t>
+            </a:r>
           </a:p>
         </p:txBody>
       </p:sp>
@@ -3555,7 +4254,7 @@
 </p:sld>
 </file>
 
-<file path=ppt/slides/slide11.xml><?xml version="1.0" encoding="utf-8"?>
+<file path=ppt/slides/slide16.xml><?xml version="1.0" encoding="utf-8"?>
 <p:sld xmlns:a="http://schemas.openxmlformats.org/drawingml/2006/main" xmlns:r="http://schemas.openxmlformats.org/officeDocument/2006/relationships" xmlns:p="http://schemas.openxmlformats.org/presentationml/2006/main">
   <p:cSld>
     <p:spTree>
@@ -3765,7 +4464,133 @@
           <a:bodyPr/>
           <a:lstStyle/>
           <a:p>
-            <a:endParaRPr lang="en-GB"/>
+            <a:r>
+              <a:rPr lang="en-GB" dirty="0" err="1"/>
+              <a:t>Različni</a:t>
+            </a:r>
+            <a:r>
+              <a:rPr lang="en-GB" dirty="0"/>
+              <a:t> </a:t>
+            </a:r>
+            <a:r>
+              <a:rPr lang="en-GB" dirty="0" err="1"/>
+              <a:t>načini</a:t>
+            </a:r>
+            <a:endParaRPr lang="en-GB" dirty="0"/>
+          </a:p>
+          <a:p>
+            <a:r>
+              <a:rPr lang="en-GB" dirty="0"/>
+              <a:t>3 </a:t>
+            </a:r>
+            <a:r>
+              <a:rPr lang="en-GB" dirty="0" err="1"/>
+              <a:t>algoritmi</a:t>
+            </a:r>
+            <a:endParaRPr lang="en-GB" dirty="0"/>
+          </a:p>
+          <a:p>
+            <a:pPr lvl="1"/>
+            <a:r>
+              <a:rPr lang="en-GB" dirty="0" err="1"/>
+              <a:t>Naivni</a:t>
+            </a:r>
+            <a:r>
+              <a:rPr lang="en-GB" dirty="0"/>
+              <a:t> oz brute force</a:t>
+            </a:r>
+          </a:p>
+          <a:p>
+            <a:pPr lvl="1"/>
+            <a:r>
+              <a:rPr lang="en-GB" dirty="0"/>
+              <a:t>Jump Flood</a:t>
+            </a:r>
+          </a:p>
+          <a:p>
+            <a:pPr lvl="1"/>
+            <a:r>
+              <a:rPr lang="en-GB" dirty="0"/>
+              <a:t>Delaunay </a:t>
+            </a:r>
+            <a:r>
+              <a:rPr lang="en-GB" dirty="0" err="1"/>
+              <a:t>triangulacija</a:t>
+            </a:r>
+            <a:endParaRPr lang="en-GB" dirty="0"/>
+          </a:p>
+          <a:p>
+            <a:pPr lvl="1"/>
+            <a:endParaRPr lang="en-GB" dirty="0"/>
+          </a:p>
+          <a:p>
+            <a:r>
+              <a:rPr lang="en-GB" dirty="0"/>
+              <a:t>Delaunay </a:t>
+            </a:r>
+            <a:r>
+              <a:rPr lang="en-GB" dirty="0" err="1"/>
+              <a:t>triangulacija</a:t>
+            </a:r>
+            <a:endParaRPr lang="en-GB" dirty="0"/>
+          </a:p>
+          <a:p>
+            <a:pPr lvl="1"/>
+            <a:r>
+              <a:rPr lang="en-GB" dirty="0"/>
+              <a:t>Dual </a:t>
+            </a:r>
+            <a:r>
+              <a:rPr lang="en-GB" dirty="0" err="1"/>
+              <a:t>končne</a:t>
+            </a:r>
+            <a:r>
+              <a:rPr lang="en-GB" dirty="0"/>
+              <a:t> </a:t>
+            </a:r>
+            <a:r>
+              <a:rPr lang="en-GB" dirty="0" err="1"/>
+              <a:t>triangulacije</a:t>
+            </a:r>
+            <a:r>
+              <a:rPr lang="en-GB" dirty="0"/>
+              <a:t> = </a:t>
+            </a:r>
+            <a:r>
+              <a:rPr lang="en-GB" dirty="0" err="1"/>
+              <a:t>Vornoievi</a:t>
+            </a:r>
+            <a:r>
+              <a:rPr lang="en-GB" dirty="0"/>
+              <a:t> diagram</a:t>
+            </a:r>
+          </a:p>
+          <a:p>
+            <a:pPr lvl="1"/>
+            <a:r>
+              <a:rPr lang="en-GB" dirty="0" err="1"/>
+              <a:t>Uporabna</a:t>
+            </a:r>
+            <a:r>
+              <a:rPr lang="en-GB" dirty="0"/>
+              <a:t> za </a:t>
+            </a:r>
+            <a:r>
+              <a:rPr lang="en-GB" dirty="0" err="1"/>
+              <a:t>računalniško</a:t>
+            </a:r>
+            <a:r>
+              <a:rPr lang="en-GB" dirty="0"/>
+              <a:t> </a:t>
+            </a:r>
+            <a:r>
+              <a:rPr lang="en-GB" dirty="0" err="1"/>
+              <a:t>grafiko</a:t>
+            </a:r>
+            <a:r>
+              <a:rPr lang="en-GB" dirty="0"/>
+              <a:t>.</a:t>
+            </a:r>
           </a:p>
         </p:txBody>
       </p:sp>
@@ -3779,6 +4604,289 @@
   <p:clrMapOvr>
     <a:masterClrMapping/>
   </p:clrMapOvr>
+  <p:timing>
+    <p:tnLst>
+      <p:par>
+        <p:cTn id="1" dur="indefinite" restart="never" nodeType="tmRoot">
+          <p:childTnLst>
+            <p:seq concurrent="1" nextAc="seek">
+              <p:cTn id="2" dur="indefinite" nodeType="mainSeq">
+                <p:childTnLst>
+                  <p:par>
+                    <p:cTn id="3" fill="hold">
+                      <p:stCondLst>
+                        <p:cond delay="indefinite"/>
+                      </p:stCondLst>
+                      <p:childTnLst>
+                        <p:par>
+                          <p:cTn id="4" fill="hold">
+                            <p:stCondLst>
+                              <p:cond delay="0"/>
+                            </p:stCondLst>
+                            <p:childTnLst>
+                              <p:par>
+                                <p:cTn id="5" presetID="1" presetClass="entr" presetSubtype="0" fill="hold" nodeType="clickEffect">
+                                  <p:stCondLst>
+                                    <p:cond delay="0"/>
+                                  </p:stCondLst>
+                                  <p:childTnLst>
+                                    <p:set>
+                                      <p:cBhvr>
+                                        <p:cTn id="6" dur="1" fill="hold">
+                                          <p:stCondLst>
+                                            <p:cond delay="0"/>
+                                          </p:stCondLst>
+                                        </p:cTn>
+                                        <p:tgtEl>
+                                          <p:spTgt spid="3">
+                                            <p:txEl>
+                                              <p:pRg st="1" end="1"/>
+                                            </p:txEl>
+                                          </p:spTgt>
+                                        </p:tgtEl>
+                                        <p:attrNameLst>
+                                          <p:attrName>style.visibility</p:attrName>
+                                        </p:attrNameLst>
+                                      </p:cBhvr>
+                                      <p:to>
+                                        <p:strVal val="visible"/>
+                                      </p:to>
+                                    </p:set>
+                                  </p:childTnLst>
+                                </p:cTn>
+                              </p:par>
+                              <p:par>
+                                <p:cTn id="7" presetID="1" presetClass="entr" presetSubtype="0" fill="hold" nodeType="withEffect">
+                                  <p:stCondLst>
+                                    <p:cond delay="0"/>
+                                  </p:stCondLst>
+                                  <p:childTnLst>
+                                    <p:set>
+                                      <p:cBhvr>
+                                        <p:cTn id="8" dur="1" fill="hold">
+                                          <p:stCondLst>
+                                            <p:cond delay="0"/>
+                                          </p:stCondLst>
+                                        </p:cTn>
+                                        <p:tgtEl>
+                                          <p:spTgt spid="3">
+                                            <p:txEl>
+                                              <p:pRg st="2" end="2"/>
+                                            </p:txEl>
+                                          </p:spTgt>
+                                        </p:tgtEl>
+                                        <p:attrNameLst>
+                                          <p:attrName>style.visibility</p:attrName>
+                                        </p:attrNameLst>
+                                      </p:cBhvr>
+                                      <p:to>
+                                        <p:strVal val="visible"/>
+                                      </p:to>
+                                    </p:set>
+                                  </p:childTnLst>
+                                </p:cTn>
+                              </p:par>
+                              <p:par>
+                                <p:cTn id="9" presetID="1" presetClass="entr" presetSubtype="0" fill="hold" nodeType="withEffect">
+                                  <p:stCondLst>
+                                    <p:cond delay="0"/>
+                                  </p:stCondLst>
+                                  <p:childTnLst>
+                                    <p:set>
+                                      <p:cBhvr>
+                                        <p:cTn id="10" dur="1" fill="hold">
+                                          <p:stCondLst>
+                                            <p:cond delay="0"/>
+                                          </p:stCondLst>
+                                        </p:cTn>
+                                        <p:tgtEl>
+                                          <p:spTgt spid="3">
+                                            <p:txEl>
+                                              <p:pRg st="3" end="3"/>
+                                            </p:txEl>
+                                          </p:spTgt>
+                                        </p:tgtEl>
+                                        <p:attrNameLst>
+                                          <p:attrName>style.visibility</p:attrName>
+                                        </p:attrNameLst>
+                                      </p:cBhvr>
+                                      <p:to>
+                                        <p:strVal val="visible"/>
+                                      </p:to>
+                                    </p:set>
+                                  </p:childTnLst>
+                                </p:cTn>
+                              </p:par>
+                              <p:par>
+                                <p:cTn id="11" presetID="1" presetClass="entr" presetSubtype="0" fill="hold" nodeType="withEffect">
+                                  <p:stCondLst>
+                                    <p:cond delay="0"/>
+                                  </p:stCondLst>
+                                  <p:childTnLst>
+                                    <p:set>
+                                      <p:cBhvr>
+                                        <p:cTn id="12" dur="1" fill="hold">
+                                          <p:stCondLst>
+                                            <p:cond delay="0"/>
+                                          </p:stCondLst>
+                                        </p:cTn>
+                                        <p:tgtEl>
+                                          <p:spTgt spid="3">
+                                            <p:txEl>
+                                              <p:pRg st="4" end="4"/>
+                                            </p:txEl>
+                                          </p:spTgt>
+                                        </p:tgtEl>
+                                        <p:attrNameLst>
+                                          <p:attrName>style.visibility</p:attrName>
+                                        </p:attrNameLst>
+                                      </p:cBhvr>
+                                      <p:to>
+                                        <p:strVal val="visible"/>
+                                      </p:to>
+                                    </p:set>
+                                  </p:childTnLst>
+                                </p:cTn>
+                              </p:par>
+                            </p:childTnLst>
+                          </p:cTn>
+                        </p:par>
+                      </p:childTnLst>
+                    </p:cTn>
+                  </p:par>
+                  <p:par>
+                    <p:cTn id="13" fill="hold">
+                      <p:stCondLst>
+                        <p:cond delay="indefinite"/>
+                      </p:stCondLst>
+                      <p:childTnLst>
+                        <p:par>
+                          <p:cTn id="14" fill="hold">
+                            <p:stCondLst>
+                              <p:cond delay="0"/>
+                            </p:stCondLst>
+                            <p:childTnLst>
+                              <p:par>
+                                <p:cTn id="15" presetID="1" presetClass="entr" presetSubtype="0" fill="hold" nodeType="clickEffect">
+                                  <p:stCondLst>
+                                    <p:cond delay="0"/>
+                                  </p:stCondLst>
+                                  <p:childTnLst>
+                                    <p:set>
+                                      <p:cBhvr>
+                                        <p:cTn id="16" dur="1" fill="hold">
+                                          <p:stCondLst>
+                                            <p:cond delay="0"/>
+                                          </p:stCondLst>
+                                        </p:cTn>
+                                        <p:tgtEl>
+                                          <p:spTgt spid="3">
+                                            <p:txEl>
+                                              <p:pRg st="6" end="6"/>
+                                            </p:txEl>
+                                          </p:spTgt>
+                                        </p:tgtEl>
+                                        <p:attrNameLst>
+                                          <p:attrName>style.visibility</p:attrName>
+                                        </p:attrNameLst>
+                                      </p:cBhvr>
+                                      <p:to>
+                                        <p:strVal val="visible"/>
+                                      </p:to>
+                                    </p:set>
+                                  </p:childTnLst>
+                                </p:cTn>
+                              </p:par>
+                              <p:par>
+                                <p:cTn id="17" presetID="1" presetClass="entr" presetSubtype="0" fill="hold" nodeType="withEffect">
+                                  <p:stCondLst>
+                                    <p:cond delay="0"/>
+                                  </p:stCondLst>
+                                  <p:childTnLst>
+                                    <p:set>
+                                      <p:cBhvr>
+                                        <p:cTn id="18" dur="1" fill="hold">
+                                          <p:stCondLst>
+                                            <p:cond delay="0"/>
+                                          </p:stCondLst>
+                                        </p:cTn>
+                                        <p:tgtEl>
+                                          <p:spTgt spid="3">
+                                            <p:txEl>
+                                              <p:pRg st="7" end="7"/>
+                                            </p:txEl>
+                                          </p:spTgt>
+                                        </p:tgtEl>
+                                        <p:attrNameLst>
+                                          <p:attrName>style.visibility</p:attrName>
+                                        </p:attrNameLst>
+                                      </p:cBhvr>
+                                      <p:to>
+                                        <p:strVal val="visible"/>
+                                      </p:to>
+                                    </p:set>
+                                  </p:childTnLst>
+                                </p:cTn>
+                              </p:par>
+                              <p:par>
+                                <p:cTn id="19" presetID="1" presetClass="entr" presetSubtype="0" fill="hold" nodeType="withEffect">
+                                  <p:stCondLst>
+                                    <p:cond delay="0"/>
+                                  </p:stCondLst>
+                                  <p:childTnLst>
+                                    <p:set>
+                                      <p:cBhvr>
+                                        <p:cTn id="20" dur="1" fill="hold">
+                                          <p:stCondLst>
+                                            <p:cond delay="0"/>
+                                          </p:stCondLst>
+                                        </p:cTn>
+                                        <p:tgtEl>
+                                          <p:spTgt spid="3">
+                                            <p:txEl>
+                                              <p:pRg st="8" end="8"/>
+                                            </p:txEl>
+                                          </p:spTgt>
+                                        </p:tgtEl>
+                                        <p:attrNameLst>
+                                          <p:attrName>style.visibility</p:attrName>
+                                        </p:attrNameLst>
+                                      </p:cBhvr>
+                                      <p:to>
+                                        <p:strVal val="visible"/>
+                                      </p:to>
+                                    </p:set>
+                                  </p:childTnLst>
+                                </p:cTn>
+                              </p:par>
+                            </p:childTnLst>
+                          </p:cTn>
+                        </p:par>
+                      </p:childTnLst>
+                    </p:cTn>
+                  </p:par>
+                </p:childTnLst>
+              </p:cTn>
+              <p:prevCondLst>
+                <p:cond evt="onPrev" delay="0">
+                  <p:tgtEl>
+                    <p:sldTgt/>
+                  </p:tgtEl>
+                </p:cond>
+              </p:prevCondLst>
+              <p:nextCondLst>
+                <p:cond evt="onNext" delay="0">
+                  <p:tgtEl>
+                    <p:sldTgt/>
+                  </p:tgtEl>
+                </p:cond>
+              </p:nextCondLst>
+            </p:seq>
+          </p:childTnLst>
+        </p:cTn>
+      </p:par>
+    </p:tnLst>
+  </p:timing>
 </p:sld>
 </file>
 
@@ -3804,7 +4912,7 @@
           <p:cNvPr id="2" name="Title 1">
             <a:extLst>
               <a:ext uri="{FF2B5EF4-FFF2-40B4-BE49-F238E27FC236}">
-                <a16:creationId xmlns:a16="http://schemas.microsoft.com/office/drawing/2014/main" id="{C3F12680-89CF-4BDB-A290-39B51C9F4ECA}"/>
+                <a16:creationId xmlns:a16="http://schemas.microsoft.com/office/drawing/2014/main" id="{54462302-554B-4CDE-9880-08BF640D58D5}"/>
               </a:ext>
             </a:extLst>
           </p:cNvPr>
@@ -3820,11 +4928,7 @@
           <a:bodyPr/>
           <a:lstStyle/>
           <a:p>
-            <a:r>
-              <a:rPr lang="en-GB" dirty="0" err="1"/>
-              <a:t>Zgodovina</a:t>
-            </a:r>
-            <a:endParaRPr lang="en-GB" dirty="0"/>
+            <a:endParaRPr lang="en-GB"/>
           </a:p>
         </p:txBody>
       </p:sp>
@@ -3833,7 +4937,7 @@
           <p:cNvPr id="3" name="Content Placeholder 2">
             <a:extLst>
               <a:ext uri="{FF2B5EF4-FFF2-40B4-BE49-F238E27FC236}">
-                <a16:creationId xmlns:a16="http://schemas.microsoft.com/office/drawing/2014/main" id="{7338BA69-FEF9-44D7-93F9-66EFF7302F13}"/>
+                <a16:creationId xmlns:a16="http://schemas.microsoft.com/office/drawing/2014/main" id="{C1614B2D-32AE-405F-A3A2-3D01E6316DDB}"/>
               </a:ext>
             </a:extLst>
           </p:cNvPr>
@@ -3849,14 +4953,50 @@
           <a:bodyPr/>
           <a:lstStyle/>
           <a:p>
-            <a:endParaRPr lang="en-GB"/>
-          </a:p>
-        </p:txBody>
-      </p:sp>
+            <a:endParaRPr lang="en-GB" dirty="0"/>
+          </a:p>
+        </p:txBody>
+      </p:sp>
+      <p:pic>
+        <p:nvPicPr>
+          <p:cNvPr id="4" name="Picture 3">
+            <a:extLst>
+              <a:ext uri="{FF2B5EF4-FFF2-40B4-BE49-F238E27FC236}">
+                <a16:creationId xmlns:a16="http://schemas.microsoft.com/office/drawing/2014/main" id="{C0FA7B99-AD6C-41CF-93C3-2AF2DD90211A}"/>
+              </a:ext>
+            </a:extLst>
+          </p:cNvPr>
+          <p:cNvPicPr>
+            <a:picLocks noChangeAspect="1"/>
+          </p:cNvPicPr>
+          <p:nvPr/>
+        </p:nvPicPr>
+        <p:blipFill>
+          <a:blip r:embed="rId2">
+            <a:extLst>
+              <a:ext uri="{28A0092B-C50C-407E-A947-70E740481C1C}">
+                <a14:useLocalDpi xmlns:a14="http://schemas.microsoft.com/office/drawing/2010/main" val="0"/>
+              </a:ext>
+            </a:extLst>
+          </a:blip>
+          <a:stretch>
+            <a:fillRect/>
+          </a:stretch>
+        </p:blipFill>
+        <p:spPr>
+          <a:xfrm>
+            <a:off x="-808177" y="0"/>
+            <a:ext cx="13621248" cy="6757416"/>
+          </a:xfrm>
+          <a:prstGeom prst="rect">
+            <a:avLst/>
+          </a:prstGeom>
+        </p:spPr>
+      </p:pic>
     </p:spTree>
     <p:extLst>
       <p:ext uri="{BB962C8B-B14F-4D97-AF65-F5344CB8AC3E}">
-        <p14:creationId xmlns:p14="http://schemas.microsoft.com/office/powerpoint/2010/main" val="1167449501"/>
+        <p14:creationId xmlns:p14="http://schemas.microsoft.com/office/powerpoint/2010/main" val="211392532"/>
       </p:ext>
     </p:extLst>
   </p:cSld>
@@ -3888,7 +5028,7 @@
           <p:cNvPr id="2" name="Title 1">
             <a:extLst>
               <a:ext uri="{FF2B5EF4-FFF2-40B4-BE49-F238E27FC236}">
-                <a16:creationId xmlns:a16="http://schemas.microsoft.com/office/drawing/2014/main" id="{40229038-C757-47FD-871F-D3C60C52CB73}"/>
+                <a16:creationId xmlns:a16="http://schemas.microsoft.com/office/drawing/2014/main" id="{C3F12680-89CF-4BDB-A290-39B51C9F4ECA}"/>
               </a:ext>
             </a:extLst>
           </p:cNvPr>
@@ -3905,9 +5045,10 @@
           <a:lstStyle/>
           <a:p>
             <a:r>
-              <a:rPr lang="en-GB" dirty="0"/>
-              <a:t>Jump flood</a:t>
-            </a:r>
+              <a:rPr lang="en-GB" dirty="0" err="1"/>
+              <a:t>Zgodovina</a:t>
+            </a:r>
+            <a:endParaRPr lang="en-GB" dirty="0"/>
           </a:p>
         </p:txBody>
       </p:sp>
@@ -3916,7 +5057,7 @@
           <p:cNvPr id="3" name="Content Placeholder 2">
             <a:extLst>
               <a:ext uri="{FF2B5EF4-FFF2-40B4-BE49-F238E27FC236}">
-                <a16:creationId xmlns:a16="http://schemas.microsoft.com/office/drawing/2014/main" id="{9CF6BB80-AE4F-49BB-9E5F-890FCDC24A34}"/>
+                <a16:creationId xmlns:a16="http://schemas.microsoft.com/office/drawing/2014/main" id="{7338BA69-FEF9-44D7-93F9-66EFF7302F13}"/>
               </a:ext>
             </a:extLst>
           </p:cNvPr>
@@ -3939,7 +5080,7 @@
     </p:spTree>
     <p:extLst>
       <p:ext uri="{BB962C8B-B14F-4D97-AF65-F5344CB8AC3E}">
-        <p14:creationId xmlns:p14="http://schemas.microsoft.com/office/powerpoint/2010/main" val="2127496846"/>
+        <p14:creationId xmlns:p14="http://schemas.microsoft.com/office/powerpoint/2010/main" val="1167449501"/>
       </p:ext>
     </p:extLst>
   </p:cSld>
@@ -3971,7 +5112,7 @@
           <p:cNvPr id="2" name="Title 1">
             <a:extLst>
               <a:ext uri="{FF2B5EF4-FFF2-40B4-BE49-F238E27FC236}">
-                <a16:creationId xmlns:a16="http://schemas.microsoft.com/office/drawing/2014/main" id="{124CFA49-2ED5-4352-AAE2-97E150B8F05F}"/>
+                <a16:creationId xmlns:a16="http://schemas.microsoft.com/office/drawing/2014/main" id="{7F33135C-A679-4185-B8A6-56F2CEA9922E}"/>
               </a:ext>
             </a:extLst>
           </p:cNvPr>
@@ -3989,7 +5130,7 @@
           <a:p>
             <a:r>
               <a:rPr lang="en-GB" dirty="0" err="1"/>
-              <a:t>Delaunajeva</a:t>
+              <a:t>Naivna</a:t>
             </a:r>
             <a:r>
               <a:rPr lang="en-GB" dirty="0"/>
@@ -3997,7 +5138,7 @@
             </a:r>
             <a:r>
               <a:rPr lang="en-GB" dirty="0" err="1"/>
-              <a:t>triangulacija</a:t>
+              <a:t>metoda</a:t>
             </a:r>
             <a:endParaRPr lang="en-GB" dirty="0"/>
           </a:p>
@@ -4008,7 +5149,7 @@
           <p:cNvPr id="3" name="Content Placeholder 2">
             <a:extLst>
               <a:ext uri="{FF2B5EF4-FFF2-40B4-BE49-F238E27FC236}">
-                <a16:creationId xmlns:a16="http://schemas.microsoft.com/office/drawing/2014/main" id="{C1A98CC0-CB9E-489E-9978-A018E67BF16A}"/>
+                <a16:creationId xmlns:a16="http://schemas.microsoft.com/office/drawing/2014/main" id="{9A9705BF-B1B6-41B4-8036-8CD473C8445A}"/>
               </a:ext>
             </a:extLst>
           </p:cNvPr>
@@ -4025,17 +5166,630 @@
           <a:lstStyle/>
           <a:p>
             <a:r>
+              <a:rPr lang="en-GB" dirty="0"/>
+              <a:t>N x N </a:t>
+            </a:r>
+            <a:r>
               <a:rPr lang="en-GB" dirty="0" err="1"/>
-              <a:t>Kaj</a:t>
-            </a:r>
+              <a:t>pikslov</a:t>
+            </a:r>
+            <a:endParaRPr lang="en-GB" dirty="0"/>
+          </a:p>
+          <a:p>
             <a:r>
               <a:rPr lang="en-GB" dirty="0"/>
-              <a:t> je in </a:t>
+              <a:t>M </a:t>
             </a:r>
             <a:r>
               <a:rPr lang="en-GB" dirty="0" err="1"/>
-              <a:t>ideja</a:t>
-            </a:r>
+              <a:t>množica</a:t>
+            </a:r>
+            <a:r>
+              <a:rPr lang="en-GB" dirty="0"/>
+              <a:t> semen</a:t>
+            </a:r>
+          </a:p>
+          <a:p>
+            <a:endParaRPr lang="en-GB" dirty="0"/>
+          </a:p>
+          <a:p>
+            <a:r>
+              <a:rPr lang="en-GB" dirty="0" err="1"/>
+              <a:t>Ideja</a:t>
+            </a:r>
+            <a:r>
+              <a:rPr lang="en-GB" dirty="0"/>
+              <a:t>: Za </a:t>
+            </a:r>
+            <a:r>
+              <a:rPr lang="en-GB" dirty="0" err="1"/>
+              <a:t>vsak</a:t>
+            </a:r>
+            <a:r>
+              <a:rPr lang="en-GB" dirty="0"/>
+              <a:t> pixel</a:t>
+            </a:r>
+          </a:p>
+          <a:p>
+            <a:pPr marL="0" indent="0">
+              <a:buNone/>
+            </a:pPr>
+            <a:r>
+              <a:rPr lang="en-GB" dirty="0"/>
+              <a:t> </a:t>
+            </a:r>
+            <a:r>
+              <a:rPr lang="en-GB" dirty="0" err="1"/>
+              <a:t>poiščemo</a:t>
+            </a:r>
+            <a:r>
+              <a:rPr lang="en-GB" dirty="0"/>
+              <a:t> </a:t>
+            </a:r>
+            <a:r>
+              <a:rPr lang="en-GB" dirty="0" err="1"/>
+              <a:t>najbližje</a:t>
+            </a:r>
+            <a:r>
+              <a:rPr lang="en-GB" dirty="0"/>
+              <a:t> seme.</a:t>
+            </a:r>
+          </a:p>
+          <a:p>
+            <a:endParaRPr lang="en-GB" dirty="0"/>
+          </a:p>
+          <a:p>
+            <a:endParaRPr lang="en-GB" dirty="0"/>
+          </a:p>
+          <a:p>
+            <a:r>
+              <a:rPr lang="en-GB" dirty="0" err="1"/>
+              <a:t>Časovna</a:t>
+            </a:r>
+            <a:r>
+              <a:rPr lang="en-GB" dirty="0"/>
+              <a:t> </a:t>
+            </a:r>
+            <a:r>
+              <a:rPr lang="en-GB" dirty="0" err="1"/>
+              <a:t>zahtevnost</a:t>
+            </a:r>
+            <a:r>
+              <a:rPr lang="en-GB" dirty="0"/>
+              <a:t>: O(N^2 * M)</a:t>
+            </a:r>
+          </a:p>
+        </p:txBody>
+      </p:sp>
+      <p:sp>
+        <p:nvSpPr>
+          <p:cNvPr id="4" name="TextBox 3">
+            <a:extLst>
+              <a:ext uri="{FF2B5EF4-FFF2-40B4-BE49-F238E27FC236}">
+                <a16:creationId xmlns:a16="http://schemas.microsoft.com/office/drawing/2014/main" id="{D851302A-07F1-471B-A277-B556686AAC3D}"/>
+              </a:ext>
+            </a:extLst>
+          </p:cNvPr>
+          <p:cNvSpPr txBox="1"/>
+          <p:nvPr/>
+        </p:nvSpPr>
+        <p:spPr>
+          <a:xfrm>
+            <a:off x="4938204" y="1351508"/>
+            <a:ext cx="9392574" cy="4154984"/>
+          </a:xfrm>
+          <a:prstGeom prst="rect">
+            <a:avLst/>
+          </a:prstGeom>
+          <a:noFill/>
+        </p:spPr>
+        <p:txBody>
+          <a:bodyPr wrap="square" rtlCol="0">
+            <a:spAutoFit/>
+          </a:bodyPr>
+          <a:lstStyle/>
+          <a:p>
+            <a:r>
+              <a:rPr lang="en-GB" sz="1600" b="0" dirty="0">
+                <a:effectLst/>
+                <a:latin typeface="Consolas" panose="020B0609020204030204" pitchFamily="49" charset="0"/>
+              </a:rPr>
+              <a:t>def </a:t>
+            </a:r>
+            <a:r>
+              <a:rPr lang="en-GB" sz="1600" b="0" dirty="0" err="1">
+                <a:effectLst/>
+                <a:latin typeface="Consolas" panose="020B0609020204030204" pitchFamily="49" charset="0"/>
+              </a:rPr>
+              <a:t>voronoi_brute_force</a:t>
+            </a:r>
+            <a:r>
+              <a:rPr lang="en-GB" sz="1600" b="0" dirty="0">
+                <a:effectLst/>
+                <a:latin typeface="Consolas" panose="020B0609020204030204" pitchFamily="49" charset="0"/>
+              </a:rPr>
+              <a:t>(</a:t>
+            </a:r>
+            <a:r>
+              <a:rPr lang="en-GB" sz="1600" b="0" dirty="0" err="1">
+                <a:effectLst/>
+                <a:latin typeface="Consolas" panose="020B0609020204030204" pitchFamily="49" charset="0"/>
+              </a:rPr>
+              <a:t>semena</a:t>
+            </a:r>
+            <a:r>
+              <a:rPr lang="en-GB" sz="1600" b="0" dirty="0">
+                <a:effectLst/>
+                <a:latin typeface="Consolas" panose="020B0609020204030204" pitchFamily="49" charset="0"/>
+              </a:rPr>
+              <a:t>, </a:t>
+            </a:r>
+            <a:r>
+              <a:rPr lang="en-GB" sz="1600" b="0" dirty="0" err="1">
+                <a:effectLst/>
+                <a:latin typeface="Consolas" panose="020B0609020204030204" pitchFamily="49" charset="0"/>
+              </a:rPr>
+              <a:t>velikost</a:t>
+            </a:r>
+            <a:r>
+              <a:rPr lang="en-GB" sz="1600" b="0" dirty="0">
+                <a:effectLst/>
+                <a:latin typeface="Consolas" panose="020B0609020204030204" pitchFamily="49" charset="0"/>
+              </a:rPr>
+              <a:t>):</a:t>
+            </a:r>
+          </a:p>
+          <a:p>
+            <a:r>
+              <a:rPr lang="en-GB" sz="1600" b="0" dirty="0">
+                <a:effectLst/>
+                <a:latin typeface="Consolas" panose="020B0609020204030204" pitchFamily="49" charset="0"/>
+              </a:rPr>
+              <a:t>    </a:t>
+            </a:r>
+            <a:r>
+              <a:rPr lang="en-GB" sz="1600" b="0" dirty="0" err="1">
+                <a:effectLst/>
+                <a:latin typeface="Consolas" panose="020B0609020204030204" pitchFamily="49" charset="0"/>
+              </a:rPr>
+              <a:t>matrika</a:t>
+            </a:r>
+            <a:r>
+              <a:rPr lang="en-GB" sz="1600" b="0" dirty="0">
+                <a:effectLst/>
+                <a:latin typeface="Consolas" panose="020B0609020204030204" pitchFamily="49" charset="0"/>
+              </a:rPr>
+              <a:t> = list()</a:t>
+            </a:r>
+          </a:p>
+          <a:p>
+            <a:r>
+              <a:rPr lang="en-GB" sz="1600" b="0" dirty="0">
+                <a:effectLst/>
+                <a:latin typeface="Consolas" panose="020B0609020204030204" pitchFamily="49" charset="0"/>
+              </a:rPr>
+              <a:t>    for x in range(</a:t>
+            </a:r>
+            <a:r>
+              <a:rPr lang="en-GB" sz="1600" b="0" dirty="0" err="1">
+                <a:effectLst/>
+                <a:latin typeface="Consolas" panose="020B0609020204030204" pitchFamily="49" charset="0"/>
+              </a:rPr>
+              <a:t>velikost</a:t>
+            </a:r>
+            <a:r>
+              <a:rPr lang="en-GB" sz="1600" b="0" dirty="0">
+                <a:effectLst/>
+                <a:latin typeface="Consolas" panose="020B0609020204030204" pitchFamily="49" charset="0"/>
+              </a:rPr>
+              <a:t>):</a:t>
+            </a:r>
+          </a:p>
+          <a:p>
+            <a:r>
+              <a:rPr lang="en-GB" sz="1600" b="0" dirty="0">
+                <a:effectLst/>
+                <a:latin typeface="Consolas" panose="020B0609020204030204" pitchFamily="49" charset="0"/>
+              </a:rPr>
+              <a:t>        </a:t>
+            </a:r>
+            <a:r>
+              <a:rPr lang="en-GB" sz="1600" b="0" dirty="0" err="1">
+                <a:effectLst/>
+                <a:latin typeface="Consolas" panose="020B0609020204030204" pitchFamily="49" charset="0"/>
+              </a:rPr>
+              <a:t>vrsta</a:t>
+            </a:r>
+            <a:r>
+              <a:rPr lang="en-GB" sz="1600" b="0" dirty="0">
+                <a:effectLst/>
+                <a:latin typeface="Consolas" panose="020B0609020204030204" pitchFamily="49" charset="0"/>
+              </a:rPr>
+              <a:t> = list()</a:t>
+            </a:r>
+          </a:p>
+          <a:p>
+            <a:r>
+              <a:rPr lang="en-GB" sz="1600" b="0" dirty="0">
+                <a:effectLst/>
+                <a:latin typeface="Consolas" panose="020B0609020204030204" pitchFamily="49" charset="0"/>
+              </a:rPr>
+              <a:t>        for y in range(</a:t>
+            </a:r>
+            <a:r>
+              <a:rPr lang="en-GB" sz="1600" b="0" dirty="0" err="1">
+                <a:effectLst/>
+                <a:latin typeface="Consolas" panose="020B0609020204030204" pitchFamily="49" charset="0"/>
+              </a:rPr>
+              <a:t>velikost</a:t>
+            </a:r>
+            <a:r>
+              <a:rPr lang="en-GB" sz="1600" b="0" dirty="0">
+                <a:effectLst/>
+                <a:latin typeface="Consolas" panose="020B0609020204030204" pitchFamily="49" charset="0"/>
+              </a:rPr>
+              <a:t>):</a:t>
+            </a:r>
+          </a:p>
+          <a:p>
+            <a:r>
+              <a:rPr lang="en-GB" sz="1600" b="0" dirty="0">
+                <a:effectLst/>
+                <a:latin typeface="Consolas" panose="020B0609020204030204" pitchFamily="49" charset="0"/>
+              </a:rPr>
+              <a:t>            </a:t>
+            </a:r>
+            <a:r>
+              <a:rPr lang="en-GB" sz="1600" b="0" dirty="0" err="1">
+                <a:effectLst/>
+                <a:latin typeface="Consolas" panose="020B0609020204030204" pitchFamily="49" charset="0"/>
+              </a:rPr>
+              <a:t>najmanjsa</a:t>
+            </a:r>
+            <a:r>
+              <a:rPr lang="en-GB" sz="1600" b="0" dirty="0">
+                <a:effectLst/>
+                <a:latin typeface="Consolas" panose="020B0609020204030204" pitchFamily="49" charset="0"/>
+              </a:rPr>
+              <a:t> = </a:t>
+            </a:r>
+            <a:r>
+              <a:rPr lang="en-GB" sz="1600" b="0" dirty="0" err="1">
+                <a:effectLst/>
+                <a:latin typeface="Consolas" panose="020B0609020204030204" pitchFamily="49" charset="0"/>
+              </a:rPr>
+              <a:t>velikost</a:t>
+            </a:r>
+            <a:endParaRPr lang="en-GB" sz="1600" b="0" dirty="0">
+              <a:effectLst/>
+              <a:latin typeface="Consolas" panose="020B0609020204030204" pitchFamily="49" charset="0"/>
+            </a:endParaRPr>
+          </a:p>
+          <a:p>
+            <a:r>
+              <a:rPr lang="en-GB" sz="1600" b="0" dirty="0">
+                <a:effectLst/>
+                <a:latin typeface="Consolas" panose="020B0609020204030204" pitchFamily="49" charset="0"/>
+              </a:rPr>
+              <a:t>            </a:t>
+            </a:r>
+            <a:r>
+              <a:rPr lang="en-GB" sz="1600" b="0" dirty="0" err="1">
+                <a:effectLst/>
+                <a:latin typeface="Consolas" panose="020B0609020204030204" pitchFamily="49" charset="0"/>
+              </a:rPr>
+              <a:t>najmanjsa_barva</a:t>
+            </a:r>
+            <a:r>
+              <a:rPr lang="en-GB" sz="1600" b="0" dirty="0">
+                <a:effectLst/>
+                <a:latin typeface="Consolas" panose="020B0609020204030204" pitchFamily="49" charset="0"/>
+              </a:rPr>
+              <a:t> = (0, 0, 0)</a:t>
+            </a:r>
+          </a:p>
+          <a:p>
+            <a:r>
+              <a:rPr lang="en-GB" sz="1600" b="0" dirty="0">
+                <a:effectLst/>
+                <a:latin typeface="Consolas" panose="020B0609020204030204" pitchFamily="49" charset="0"/>
+              </a:rPr>
+              <a:t>            for </a:t>
+            </a:r>
+            <a:r>
+              <a:rPr lang="en-GB" sz="1600" b="0" dirty="0" err="1">
+                <a:effectLst/>
+                <a:latin typeface="Consolas" panose="020B0609020204030204" pitchFamily="49" charset="0"/>
+              </a:rPr>
+              <a:t>barva</a:t>
+            </a:r>
+            <a:r>
+              <a:rPr lang="en-GB" sz="1600" b="0" dirty="0">
+                <a:effectLst/>
+                <a:latin typeface="Consolas" panose="020B0609020204030204" pitchFamily="49" charset="0"/>
+              </a:rPr>
+              <a:t>, </a:t>
+            </a:r>
+            <a:r>
+              <a:rPr lang="en-GB" sz="1600" b="0" dirty="0" err="1">
+                <a:effectLst/>
+                <a:latin typeface="Consolas" panose="020B0609020204030204" pitchFamily="49" charset="0"/>
+              </a:rPr>
+              <a:t>koordinate</a:t>
+            </a:r>
+            <a:r>
+              <a:rPr lang="en-GB" sz="1600" b="0" dirty="0">
+                <a:effectLst/>
+                <a:latin typeface="Consolas" panose="020B0609020204030204" pitchFamily="49" charset="0"/>
+              </a:rPr>
+              <a:t> in </a:t>
+            </a:r>
+            <a:r>
+              <a:rPr lang="en-GB" sz="1600" b="0" dirty="0" err="1">
+                <a:effectLst/>
+                <a:latin typeface="Consolas" panose="020B0609020204030204" pitchFamily="49" charset="0"/>
+              </a:rPr>
+              <a:t>semena.items</a:t>
+            </a:r>
+            <a:r>
+              <a:rPr lang="en-GB" sz="1600" b="0" dirty="0">
+                <a:effectLst/>
+                <a:latin typeface="Consolas" panose="020B0609020204030204" pitchFamily="49" charset="0"/>
+              </a:rPr>
+              <a:t>():</a:t>
+            </a:r>
+          </a:p>
+          <a:p>
+            <a:r>
+              <a:rPr lang="en-GB" sz="1600" b="0" dirty="0">
+                <a:effectLst/>
+                <a:latin typeface="Consolas" panose="020B0609020204030204" pitchFamily="49" charset="0"/>
+              </a:rPr>
+              <a:t>                </a:t>
+            </a:r>
+            <a:r>
+              <a:rPr lang="en-GB" sz="1600" b="0" dirty="0" err="1">
+                <a:effectLst/>
+                <a:latin typeface="Consolas" panose="020B0609020204030204" pitchFamily="49" charset="0"/>
+              </a:rPr>
+              <a:t>razdalja</a:t>
+            </a:r>
+            <a:r>
+              <a:rPr lang="en-GB" sz="1600" b="0" dirty="0">
+                <a:effectLst/>
+                <a:latin typeface="Consolas" panose="020B0609020204030204" pitchFamily="49" charset="0"/>
+              </a:rPr>
+              <a:t> = </a:t>
+            </a:r>
+            <a:r>
+              <a:rPr lang="en-GB" sz="1600" b="0" dirty="0" err="1">
+                <a:effectLst/>
+                <a:latin typeface="Consolas" panose="020B0609020204030204" pitchFamily="49" charset="0"/>
+              </a:rPr>
+              <a:t>k_ta_razdalja</a:t>
+            </a:r>
+            <a:r>
+              <a:rPr lang="en-GB" sz="1600" b="0" dirty="0">
+                <a:effectLst/>
+                <a:latin typeface="Consolas" panose="020B0609020204030204" pitchFamily="49" charset="0"/>
+              </a:rPr>
+              <a:t>([x, y], </a:t>
+            </a:r>
+            <a:r>
+              <a:rPr lang="en-GB" sz="1600" b="0" dirty="0" err="1">
+                <a:effectLst/>
+                <a:latin typeface="Consolas" panose="020B0609020204030204" pitchFamily="49" charset="0"/>
+              </a:rPr>
+              <a:t>koordinate</a:t>
+            </a:r>
+            <a:r>
+              <a:rPr lang="en-GB" sz="1600" b="0" dirty="0">
+                <a:effectLst/>
+                <a:latin typeface="Consolas" panose="020B0609020204030204" pitchFamily="49" charset="0"/>
+              </a:rPr>
+              <a:t>)</a:t>
+            </a:r>
+          </a:p>
+          <a:p>
+            <a:r>
+              <a:rPr lang="en-GB" sz="1600" b="0" dirty="0">
+                <a:effectLst/>
+                <a:latin typeface="Consolas" panose="020B0609020204030204" pitchFamily="49" charset="0"/>
+              </a:rPr>
+              <a:t>                if  </a:t>
+            </a:r>
+            <a:r>
+              <a:rPr lang="en-GB" sz="1600" b="0" dirty="0" err="1">
+                <a:effectLst/>
+                <a:latin typeface="Consolas" panose="020B0609020204030204" pitchFamily="49" charset="0"/>
+              </a:rPr>
+              <a:t>razdalja</a:t>
+            </a:r>
+            <a:r>
+              <a:rPr lang="en-GB" sz="1600" b="0" dirty="0">
+                <a:effectLst/>
+                <a:latin typeface="Consolas" panose="020B0609020204030204" pitchFamily="49" charset="0"/>
+              </a:rPr>
+              <a:t> &lt; </a:t>
+            </a:r>
+            <a:r>
+              <a:rPr lang="en-GB" sz="1600" b="0" dirty="0" err="1">
+                <a:effectLst/>
+                <a:latin typeface="Consolas" panose="020B0609020204030204" pitchFamily="49" charset="0"/>
+              </a:rPr>
+              <a:t>najmanjsa</a:t>
+            </a:r>
+            <a:r>
+              <a:rPr lang="en-GB" sz="1600" b="0" dirty="0">
+                <a:effectLst/>
+                <a:latin typeface="Consolas" panose="020B0609020204030204" pitchFamily="49" charset="0"/>
+              </a:rPr>
+              <a:t>:</a:t>
+            </a:r>
+          </a:p>
+          <a:p>
+            <a:r>
+              <a:rPr lang="en-GB" sz="1600" b="0" dirty="0">
+                <a:effectLst/>
+                <a:latin typeface="Consolas" panose="020B0609020204030204" pitchFamily="49" charset="0"/>
+              </a:rPr>
+              <a:t>                    </a:t>
+            </a:r>
+            <a:r>
+              <a:rPr lang="en-GB" sz="1600" b="0" dirty="0" err="1">
+                <a:effectLst/>
+                <a:latin typeface="Consolas" panose="020B0609020204030204" pitchFamily="49" charset="0"/>
+              </a:rPr>
+              <a:t>najmanjsa</a:t>
+            </a:r>
+            <a:r>
+              <a:rPr lang="en-GB" sz="1600" b="0" dirty="0">
+                <a:effectLst/>
+                <a:latin typeface="Consolas" panose="020B0609020204030204" pitchFamily="49" charset="0"/>
+              </a:rPr>
+              <a:t> = </a:t>
+            </a:r>
+            <a:r>
+              <a:rPr lang="en-GB" sz="1600" b="0" dirty="0" err="1">
+                <a:effectLst/>
+                <a:latin typeface="Consolas" panose="020B0609020204030204" pitchFamily="49" charset="0"/>
+              </a:rPr>
+              <a:t>razdalja</a:t>
+            </a:r>
+            <a:endParaRPr lang="en-GB" sz="1600" b="0" dirty="0">
+              <a:effectLst/>
+              <a:latin typeface="Consolas" panose="020B0609020204030204" pitchFamily="49" charset="0"/>
+            </a:endParaRPr>
+          </a:p>
+          <a:p>
+            <a:r>
+              <a:rPr lang="en-GB" sz="1600" b="0" dirty="0">
+                <a:effectLst/>
+                <a:latin typeface="Consolas" panose="020B0609020204030204" pitchFamily="49" charset="0"/>
+              </a:rPr>
+              <a:t>                    </a:t>
+            </a:r>
+            <a:r>
+              <a:rPr lang="en-GB" sz="1600" b="0" dirty="0" err="1">
+                <a:effectLst/>
+                <a:latin typeface="Consolas" panose="020B0609020204030204" pitchFamily="49" charset="0"/>
+              </a:rPr>
+              <a:t>najmanjsa_barva</a:t>
+            </a:r>
+            <a:r>
+              <a:rPr lang="en-GB" sz="1600" b="0" dirty="0">
+                <a:effectLst/>
+                <a:latin typeface="Consolas" panose="020B0609020204030204" pitchFamily="49" charset="0"/>
+              </a:rPr>
+              <a:t> = </a:t>
+            </a:r>
+            <a:r>
+              <a:rPr lang="en-GB" sz="1600" b="0" dirty="0" err="1">
+                <a:effectLst/>
+                <a:latin typeface="Consolas" panose="020B0609020204030204" pitchFamily="49" charset="0"/>
+              </a:rPr>
+              <a:t>barva</a:t>
+            </a:r>
+            <a:endParaRPr lang="en-GB" sz="1600" b="0" dirty="0">
+              <a:effectLst/>
+              <a:latin typeface="Consolas" panose="020B0609020204030204" pitchFamily="49" charset="0"/>
+            </a:endParaRPr>
+          </a:p>
+          <a:p>
+            <a:r>
+              <a:rPr lang="en-GB" sz="1600" b="0" dirty="0">
+                <a:effectLst/>
+                <a:latin typeface="Consolas" panose="020B0609020204030204" pitchFamily="49" charset="0"/>
+              </a:rPr>
+              <a:t>            </a:t>
+            </a:r>
+            <a:r>
+              <a:rPr lang="en-GB" sz="1600" b="0" dirty="0" err="1">
+                <a:effectLst/>
+                <a:latin typeface="Consolas" panose="020B0609020204030204" pitchFamily="49" charset="0"/>
+              </a:rPr>
+              <a:t>vrsta.append</a:t>
+            </a:r>
+            <a:r>
+              <a:rPr lang="en-GB" sz="1600" b="0" dirty="0">
+                <a:effectLst/>
+                <a:latin typeface="Consolas" panose="020B0609020204030204" pitchFamily="49" charset="0"/>
+              </a:rPr>
+              <a:t>(</a:t>
+            </a:r>
+            <a:r>
+              <a:rPr lang="en-GB" sz="1600" b="0" dirty="0" err="1">
+                <a:effectLst/>
+                <a:latin typeface="Consolas" panose="020B0609020204030204" pitchFamily="49" charset="0"/>
+              </a:rPr>
+              <a:t>najmanjsa_barva</a:t>
+            </a:r>
+            <a:r>
+              <a:rPr lang="en-GB" sz="1600" b="0" dirty="0">
+                <a:effectLst/>
+                <a:latin typeface="Consolas" panose="020B0609020204030204" pitchFamily="49" charset="0"/>
+              </a:rPr>
+              <a:t>)</a:t>
+            </a:r>
+          </a:p>
+          <a:p>
+            <a:r>
+              <a:rPr lang="en-GB" sz="1600" b="0" dirty="0">
+                <a:effectLst/>
+                <a:latin typeface="Consolas" panose="020B0609020204030204" pitchFamily="49" charset="0"/>
+              </a:rPr>
+              <a:t>        </a:t>
+            </a:r>
+            <a:r>
+              <a:rPr lang="en-GB" sz="1600" b="0" dirty="0" err="1">
+                <a:effectLst/>
+                <a:latin typeface="Consolas" panose="020B0609020204030204" pitchFamily="49" charset="0"/>
+              </a:rPr>
+              <a:t>matrika.append</a:t>
+            </a:r>
+            <a:r>
+              <a:rPr lang="en-GB" sz="1600" b="0" dirty="0">
+                <a:effectLst/>
+                <a:latin typeface="Consolas" panose="020B0609020204030204" pitchFamily="49" charset="0"/>
+              </a:rPr>
+              <a:t>(</a:t>
+            </a:r>
+            <a:r>
+              <a:rPr lang="en-GB" sz="1600" b="0" dirty="0" err="1">
+                <a:effectLst/>
+                <a:latin typeface="Consolas" panose="020B0609020204030204" pitchFamily="49" charset="0"/>
+              </a:rPr>
+              <a:t>vrsta</a:t>
+            </a:r>
+            <a:r>
+              <a:rPr lang="en-GB" sz="1600" b="0" dirty="0">
+                <a:effectLst/>
+                <a:latin typeface="Consolas" panose="020B0609020204030204" pitchFamily="49" charset="0"/>
+              </a:rPr>
+              <a:t>)</a:t>
+            </a:r>
+          </a:p>
+          <a:p>
+            <a:r>
+              <a:rPr lang="en-GB" sz="1600" b="0" dirty="0">
+                <a:effectLst/>
+                <a:latin typeface="Consolas" panose="020B0609020204030204" pitchFamily="49" charset="0"/>
+              </a:rPr>
+              <a:t>    return </a:t>
+            </a:r>
+            <a:r>
+              <a:rPr lang="en-GB" sz="1600" b="0" dirty="0" err="1">
+                <a:effectLst/>
+                <a:latin typeface="Consolas" panose="020B0609020204030204" pitchFamily="49" charset="0"/>
+              </a:rPr>
+              <a:t>matrika</a:t>
+            </a:r>
+            <a:endParaRPr lang="en-GB" sz="1600" b="0" dirty="0">
+              <a:effectLst/>
+              <a:latin typeface="Consolas" panose="020B0609020204030204" pitchFamily="49" charset="0"/>
+            </a:endParaRPr>
+          </a:p>
+          <a:p>
             <a:endParaRPr lang="en-GB" dirty="0"/>
           </a:p>
         </p:txBody>
@@ -4043,13 +5797,140 @@
     </p:spTree>
     <p:extLst>
       <p:ext uri="{BB962C8B-B14F-4D97-AF65-F5344CB8AC3E}">
-        <p14:creationId xmlns:p14="http://schemas.microsoft.com/office/powerpoint/2010/main" val="214125740"/>
+        <p14:creationId xmlns:p14="http://schemas.microsoft.com/office/powerpoint/2010/main" val="1705334797"/>
       </p:ext>
     </p:extLst>
   </p:cSld>
   <p:clrMapOvr>
     <a:masterClrMapping/>
   </p:clrMapOvr>
+  <p:timing>
+    <p:tnLst>
+      <p:par>
+        <p:cTn id="1" dur="indefinite" restart="never" nodeType="tmRoot">
+          <p:childTnLst>
+            <p:seq concurrent="1" nextAc="seek">
+              <p:cTn id="2" dur="indefinite" nodeType="mainSeq">
+                <p:childTnLst>
+                  <p:par>
+                    <p:cTn id="3" fill="hold">
+                      <p:stCondLst>
+                        <p:cond delay="indefinite"/>
+                      </p:stCondLst>
+                      <p:childTnLst>
+                        <p:par>
+                          <p:cTn id="4" fill="hold">
+                            <p:stCondLst>
+                              <p:cond delay="0"/>
+                            </p:stCondLst>
+                            <p:childTnLst>
+                              <p:par>
+                                <p:cTn id="5" presetID="1" presetClass="entr" presetSubtype="0" fill="hold" grpId="0" nodeType="clickEffect">
+                                  <p:stCondLst>
+                                    <p:cond delay="0"/>
+                                  </p:stCondLst>
+                                  <p:childTnLst>
+                                    <p:set>
+                                      <p:cBhvr>
+                                        <p:cTn id="6" dur="1" fill="hold">
+                                          <p:stCondLst>
+                                            <p:cond delay="0"/>
+                                          </p:stCondLst>
+                                        </p:cTn>
+                                        <p:tgtEl>
+                                          <p:spTgt spid="4"/>
+                                        </p:tgtEl>
+                                        <p:attrNameLst>
+                                          <p:attrName>style.visibility</p:attrName>
+                                        </p:attrNameLst>
+                                      </p:cBhvr>
+                                      <p:to>
+                                        <p:strVal val="visible"/>
+                                      </p:to>
+                                    </p:set>
+                                  </p:childTnLst>
+                                </p:cTn>
+                              </p:par>
+                            </p:childTnLst>
+                          </p:cTn>
+                        </p:par>
+                      </p:childTnLst>
+                    </p:cTn>
+                  </p:par>
+                  <p:par>
+                    <p:cTn id="7" fill="hold">
+                      <p:stCondLst>
+                        <p:cond delay="indefinite"/>
+                      </p:stCondLst>
+                      <p:childTnLst>
+                        <p:par>
+                          <p:cTn id="8" fill="hold">
+                            <p:stCondLst>
+                              <p:cond delay="0"/>
+                            </p:stCondLst>
+                            <p:childTnLst>
+                              <p:par>
+                                <p:cTn id="9" presetID="1" presetClass="entr" presetSubtype="0" fill="hold" nodeType="clickEffect">
+                                  <p:stCondLst>
+                                    <p:cond delay="0"/>
+                                  </p:stCondLst>
+                                  <p:childTnLst>
+                                    <p:set>
+                                      <p:cBhvr>
+                                        <p:cTn id="10" dur="1" fill="hold">
+                                          <p:stCondLst>
+                                            <p:cond delay="0"/>
+                                          </p:stCondLst>
+                                        </p:cTn>
+                                        <p:tgtEl>
+                                          <p:spTgt spid="3">
+                                            <p:txEl>
+                                              <p:pRg st="7" end="7"/>
+                                            </p:txEl>
+                                          </p:spTgt>
+                                        </p:tgtEl>
+                                        <p:attrNameLst>
+                                          <p:attrName>style.visibility</p:attrName>
+                                        </p:attrNameLst>
+                                      </p:cBhvr>
+                                      <p:to>
+                                        <p:strVal val="visible"/>
+                                      </p:to>
+                                    </p:set>
+                                  </p:childTnLst>
+                                </p:cTn>
+                              </p:par>
+                            </p:childTnLst>
+                          </p:cTn>
+                        </p:par>
+                      </p:childTnLst>
+                    </p:cTn>
+                  </p:par>
+                </p:childTnLst>
+              </p:cTn>
+              <p:prevCondLst>
+                <p:cond evt="onPrev" delay="0">
+                  <p:tgtEl>
+                    <p:sldTgt/>
+                  </p:tgtEl>
+                </p:cond>
+              </p:prevCondLst>
+              <p:nextCondLst>
+                <p:cond evt="onNext" delay="0">
+                  <p:tgtEl>
+                    <p:sldTgt/>
+                  </p:tgtEl>
+                </p:cond>
+              </p:nextCondLst>
+            </p:seq>
+          </p:childTnLst>
+        </p:cTn>
+      </p:par>
+    </p:tnLst>
+    <p:bldLst>
+      <p:bldP spid="4" grpId="0"/>
+    </p:bldLst>
+  </p:timing>
 </p:sld>
 </file>
 
@@ -4075,7 +5956,7 @@
           <p:cNvPr id="2" name="Title 1">
             <a:extLst>
               <a:ext uri="{FF2B5EF4-FFF2-40B4-BE49-F238E27FC236}">
-                <a16:creationId xmlns:a16="http://schemas.microsoft.com/office/drawing/2014/main" id="{BBFE05F7-F9CD-4E1E-BBD4-536CF4320A93}"/>
+                <a16:creationId xmlns:a16="http://schemas.microsoft.com/office/drawing/2014/main" id="{40229038-C757-47FD-871F-D3C60C52CB73}"/>
               </a:ext>
             </a:extLst>
           </p:cNvPr>
@@ -4086,66 +5967,1147 @@
             <p:ph type="title"/>
           </p:nvPr>
         </p:nvSpPr>
-        <p:spPr/>
+        <p:spPr>
+          <a:xfrm>
+            <a:off x="838200" y="319405"/>
+            <a:ext cx="10515600" cy="1325563"/>
+          </a:xfrm>
+        </p:spPr>
         <p:txBody>
           <a:bodyPr/>
           <a:lstStyle/>
           <a:p>
             <a:r>
-              <a:rPr lang="en-GB" dirty="0" err="1"/>
-              <a:t>Delaunajeva</a:t>
-            </a:r>
-            <a:r>
               <a:rPr lang="en-GB" dirty="0"/>
-              <a:t> </a:t>
-            </a:r>
-            <a:r>
-              <a:rPr lang="en-GB" dirty="0" err="1"/>
-              <a:t>triangulacija</a:t>
-            </a:r>
-            <a:endParaRPr lang="en-GB" dirty="0"/>
-          </a:p>
-        </p:txBody>
-      </p:sp>
-      <p:sp>
-        <p:nvSpPr>
-          <p:cNvPr id="3" name="Content Placeholder 2">
-            <a:extLst>
-              <a:ext uri="{FF2B5EF4-FFF2-40B4-BE49-F238E27FC236}">
-                <a16:creationId xmlns:a16="http://schemas.microsoft.com/office/drawing/2014/main" id="{7BAD4088-F99E-4ADC-A4D7-2E80DC233616}"/>
-              </a:ext>
-            </a:extLst>
-          </p:cNvPr>
-          <p:cNvSpPr>
-            <a:spLocks noGrp="1"/>
-          </p:cNvSpPr>
-          <p:nvPr>
-            <p:ph idx="1"/>
-          </p:nvPr>
-        </p:nvSpPr>
-        <p:spPr/>
-        <p:txBody>
-          <a:bodyPr/>
+              <a:t>Jump flood</a:t>
+            </a:r>
+          </a:p>
+        </p:txBody>
+      </p:sp>
+      <mc:AlternateContent xmlns:mc="http://schemas.openxmlformats.org/markup-compatibility/2006">
+        <mc:Choice xmlns:a14="http://schemas.microsoft.com/office/drawing/2010/main" Requires="a14">
+          <p:sp>
+            <p:nvSpPr>
+              <p:cNvPr id="3" name="Content Placeholder 2">
+                <a:extLst>
+                  <a:ext uri="{FF2B5EF4-FFF2-40B4-BE49-F238E27FC236}">
+                    <a16:creationId xmlns:a16="http://schemas.microsoft.com/office/drawing/2014/main" id="{9CF6BB80-AE4F-49BB-9E5F-890FCDC24A34}"/>
+                  </a:ext>
+                </a:extLst>
+              </p:cNvPr>
+              <p:cNvSpPr>
+                <a:spLocks noGrp="1"/>
+              </p:cNvSpPr>
+              <p:nvPr>
+                <p:ph idx="1"/>
+              </p:nvPr>
+            </p:nvSpPr>
+            <p:spPr>
+              <a:xfrm>
+                <a:off x="838200" y="1523784"/>
+                <a:ext cx="10515600" cy="4904447"/>
+              </a:xfrm>
+            </p:spPr>
+            <p:txBody>
+              <a:bodyPr>
+                <a:normAutofit/>
+              </a:bodyPr>
+              <a:lstStyle/>
+              <a:p>
+                <a:r>
+                  <a:rPr lang="en-GB" dirty="0"/>
+                  <a:t>K </a:t>
+                </a:r>
+                <a:r>
+                  <a:rPr lang="az-Cyrl-AZ" dirty="0"/>
+                  <a:t>є</a:t>
+                </a:r>
+                <a:r>
+                  <a:rPr lang="en-GB" dirty="0"/>
+                  <a:t> {N/2, N/4, …, 1}  - </a:t>
+                </a:r>
+                <a:r>
+                  <a:rPr lang="en-GB" dirty="0" err="1"/>
+                  <a:t>korak</a:t>
+                </a:r>
+                <a:endParaRPr lang="en-GB" dirty="0"/>
+              </a:p>
+              <a:p>
+                <a:endParaRPr lang="en-GB" dirty="0"/>
+              </a:p>
+              <a:p>
+                <a:r>
+                  <a:rPr lang="en-GB" dirty="0" err="1"/>
+                  <a:t>Sprehodimo</a:t>
+                </a:r>
+                <a:r>
+                  <a:rPr lang="en-GB" dirty="0"/>
+                  <a:t> </a:t>
+                </a:r>
+                <a:r>
+                  <a:rPr lang="en-GB" dirty="0" err="1"/>
+                  <a:t>čez</a:t>
+                </a:r>
+                <a:r>
+                  <a:rPr lang="en-GB" dirty="0"/>
+                  <a:t> </a:t>
+                </a:r>
+                <a:r>
+                  <a:rPr lang="en-GB" dirty="0" err="1"/>
+                  <a:t>vsa</a:t>
+                </a:r>
+                <a:r>
+                  <a:rPr lang="en-GB" dirty="0"/>
+                  <a:t> P</a:t>
+                </a:r>
+                <a:r>
+                  <a:rPr lang="az-Cyrl-AZ" dirty="0"/>
+                  <a:t> є </a:t>
+                </a:r>
+                <a:r>
+                  <a:rPr lang="en-GB" dirty="0" err="1"/>
+                  <a:t>semena</a:t>
+                </a:r>
+                <a:r>
+                  <a:rPr lang="en-GB" dirty="0"/>
+                  <a:t>  in </a:t>
+                </a:r>
+                <a:r>
+                  <a:rPr lang="en-GB" dirty="0" err="1"/>
+                  <a:t>pogledamo</a:t>
+                </a:r>
+                <a:r>
+                  <a:rPr lang="en-GB" dirty="0"/>
+                  <a:t>:</a:t>
+                </a:r>
+              </a:p>
+              <a:p>
+                <a:pPr marL="457200" lvl="1" indent="0">
+                  <a:buNone/>
+                </a:pPr>
+                <a:r>
+                  <a:rPr lang="en-GB" dirty="0"/>
+                  <a:t>Q = (x + </a:t>
+                </a:r>
+                <a:r>
+                  <a:rPr lang="en-GB" dirty="0" err="1"/>
+                  <a:t>i</a:t>
+                </a:r>
+                <a:r>
+                  <a:rPr lang="en-GB" dirty="0"/>
+                  <a:t>, y + j) </a:t>
+                </a:r>
+                <a:r>
+                  <a:rPr lang="en-GB" dirty="0" err="1"/>
+                  <a:t>kjer</a:t>
+                </a:r>
+                <a:r>
+                  <a:rPr lang="en-GB" dirty="0"/>
+                  <a:t> so </a:t>
+                </a:r>
+                <a:r>
+                  <a:rPr lang="en-GB" dirty="0" err="1"/>
+                  <a:t>i,j</a:t>
+                </a:r>
+                <a:r>
+                  <a:rPr lang="az-Cyrl-AZ" dirty="0"/>
+                  <a:t> є</a:t>
+                </a:r>
+                <a:r>
+                  <a:rPr lang="en-GB" dirty="0"/>
+                  <a:t> {-k, 0, k}</a:t>
+                </a:r>
+              </a:p>
+              <a:p>
+                <a:pPr marL="457200" lvl="1" indent="0">
+                  <a:buNone/>
+                </a:pPr>
+                <a:endParaRPr lang="en-GB" dirty="0"/>
+              </a:p>
+              <a:p>
+                <a:r>
+                  <a:rPr lang="en-GB" dirty="0" err="1"/>
+                  <a:t>Dve</a:t>
+                </a:r>
+                <a:r>
+                  <a:rPr lang="en-GB" dirty="0"/>
+                  <a:t> </a:t>
+                </a:r>
+                <a:r>
+                  <a:rPr lang="en-GB" dirty="0" err="1"/>
+                  <a:t>možnosti</a:t>
+                </a:r>
+                <a:r>
+                  <a:rPr lang="en-GB" dirty="0"/>
+                  <a:t>:</a:t>
+                </a:r>
+              </a:p>
+              <a:p>
+                <a:pPr lvl="1"/>
+                <a:r>
+                  <a:rPr lang="en-GB" dirty="0"/>
+                  <a:t>Q </a:t>
+                </a:r>
+                <a:r>
+                  <a:rPr lang="en-GB" dirty="0" err="1"/>
+                  <a:t>še</a:t>
+                </a:r>
+                <a:r>
+                  <a:rPr lang="en-GB" dirty="0"/>
+                  <a:t> </a:t>
+                </a:r>
+                <a:r>
+                  <a:rPr lang="en-GB" dirty="0" err="1"/>
+                  <a:t>nima</a:t>
+                </a:r>
+                <a:r>
+                  <a:rPr lang="en-GB" dirty="0"/>
+                  <a:t> </a:t>
+                </a:r>
+                <a:r>
+                  <a:rPr lang="en-GB" dirty="0" err="1"/>
+                  <a:t>najbližjega</a:t>
+                </a:r>
+                <a:r>
+                  <a:rPr lang="en-GB" dirty="0"/>
+                  <a:t> </a:t>
+                </a:r>
+                <a:r>
+                  <a:rPr lang="en-GB" dirty="0">
+                    <a:sym typeface="Wingdings" panose="05000000000000000000" pitchFamily="2" charset="2"/>
+                  </a:rPr>
+                  <a:t> Ga </a:t>
+                </a:r>
+                <a:r>
+                  <a:rPr lang="en-GB" dirty="0" err="1">
+                    <a:sym typeface="Wingdings" panose="05000000000000000000" pitchFamily="2" charset="2"/>
+                  </a:rPr>
+                  <a:t>pobarvamo</a:t>
+                </a:r>
+                <a:r>
+                  <a:rPr lang="en-GB" dirty="0">
+                    <a:sym typeface="Wingdings" panose="05000000000000000000" pitchFamily="2" charset="2"/>
+                  </a:rPr>
+                  <a:t> z </a:t>
+                </a:r>
+                <a:r>
+                  <a:rPr lang="en-GB" dirty="0" err="1">
+                    <a:sym typeface="Wingdings" panose="05000000000000000000" pitchFamily="2" charset="2"/>
+                  </a:rPr>
+                  <a:t>našim</a:t>
+                </a:r>
+                <a:r>
+                  <a:rPr lang="en-GB" dirty="0">
+                    <a:sym typeface="Wingdings" panose="05000000000000000000" pitchFamily="2" charset="2"/>
+                  </a:rPr>
+                  <a:t> </a:t>
+                </a:r>
+                <a:r>
+                  <a:rPr lang="en-GB" dirty="0" err="1">
+                    <a:sym typeface="Wingdings" panose="05000000000000000000" pitchFamily="2" charset="2"/>
+                  </a:rPr>
+                  <a:t>semena</a:t>
+                </a:r>
+                <a:r>
+                  <a:rPr lang="en-GB" dirty="0">
+                    <a:sym typeface="Wingdings" panose="05000000000000000000" pitchFamily="2" charset="2"/>
+                  </a:rPr>
+                  <a:t>[P] in </a:t>
+                </a:r>
+                <a:r>
+                  <a:rPr lang="en-GB" dirty="0" err="1">
+                    <a:sym typeface="Wingdings" panose="05000000000000000000" pitchFamily="2" charset="2"/>
+                  </a:rPr>
+                  <a:t>dodamo</a:t>
+                </a:r>
+                <a:r>
+                  <a:rPr lang="en-GB" dirty="0">
+                    <a:sym typeface="Wingdings" panose="05000000000000000000" pitchFamily="2" charset="2"/>
+                  </a:rPr>
+                  <a:t> v </a:t>
+                </a:r>
+                <a:r>
+                  <a:rPr lang="en-GB" dirty="0" err="1">
+                    <a:sym typeface="Wingdings" panose="05000000000000000000" pitchFamily="2" charset="2"/>
+                  </a:rPr>
+                  <a:t>semena</a:t>
+                </a:r>
+                <a:endParaRPr lang="en-GB" dirty="0">
+                  <a:sym typeface="Wingdings" panose="05000000000000000000" pitchFamily="2" charset="2"/>
+                </a:endParaRPr>
+              </a:p>
+              <a:p>
+                <a:pPr lvl="1"/>
+                <a:r>
+                  <a:rPr lang="en-GB" dirty="0">
+                    <a:sym typeface="Wingdings" panose="05000000000000000000" pitchFamily="2" charset="2"/>
+                  </a:rPr>
+                  <a:t>Q </a:t>
+                </a:r>
+                <a:r>
+                  <a:rPr lang="en-GB" dirty="0" err="1">
+                    <a:sym typeface="Wingdings" panose="05000000000000000000" pitchFamily="2" charset="2"/>
+                  </a:rPr>
+                  <a:t>že</a:t>
+                </a:r>
+                <a:r>
+                  <a:rPr lang="en-GB" dirty="0">
+                    <a:sym typeface="Wingdings" panose="05000000000000000000" pitchFamily="2" charset="2"/>
+                  </a:rPr>
+                  <a:t> </a:t>
+                </a:r>
+                <a:r>
+                  <a:rPr lang="en-GB" dirty="0" err="1">
+                    <a:sym typeface="Wingdings" panose="05000000000000000000" pitchFamily="2" charset="2"/>
+                  </a:rPr>
+                  <a:t>ima</a:t>
+                </a:r>
+                <a:r>
+                  <a:rPr lang="en-GB" dirty="0">
+                    <a:sym typeface="Wingdings" panose="05000000000000000000" pitchFamily="2" charset="2"/>
+                  </a:rPr>
+                  <a:t> </a:t>
+                </a:r>
+                <a:r>
+                  <a:rPr lang="en-GB" dirty="0" err="1">
+                    <a:sym typeface="Wingdings" panose="05000000000000000000" pitchFamily="2" charset="2"/>
+                  </a:rPr>
+                  <a:t>najbližjega</a:t>
+                </a:r>
+                <a:r>
+                  <a:rPr lang="en-GB" dirty="0">
+                    <a:sym typeface="Wingdings" panose="05000000000000000000" pitchFamily="2" charset="2"/>
+                  </a:rPr>
+                  <a:t>  </a:t>
+                </a:r>
+                <a:r>
+                  <a:rPr lang="en-GB" dirty="0" err="1">
+                    <a:sym typeface="Wingdings" panose="05000000000000000000" pitchFamily="2" charset="2"/>
+                  </a:rPr>
+                  <a:t>razdalja</a:t>
+                </a:r>
+                <a:r>
+                  <a:rPr lang="en-GB" dirty="0">
+                    <a:sym typeface="Wingdings" panose="05000000000000000000" pitchFamily="2" charset="2"/>
+                  </a:rPr>
+                  <a:t>(</a:t>
+                </a:r>
+                <a:r>
+                  <a:rPr lang="en-GB" dirty="0" err="1">
+                    <a:sym typeface="Wingdings" panose="05000000000000000000" pitchFamily="2" charset="2"/>
+                  </a:rPr>
+                  <a:t>semena</a:t>
+                </a:r>
+                <a:r>
+                  <a:rPr lang="en-GB" dirty="0">
+                    <a:sym typeface="Wingdings" panose="05000000000000000000" pitchFamily="2" charset="2"/>
+                  </a:rPr>
+                  <a:t>[P], Q) &lt; </a:t>
+                </a:r>
+                <a:r>
+                  <a:rPr lang="en-GB" dirty="0" err="1">
+                    <a:sym typeface="Wingdings" panose="05000000000000000000" pitchFamily="2" charset="2"/>
+                  </a:rPr>
+                  <a:t>razdalja</a:t>
+                </a:r>
+                <a:r>
+                  <a:rPr lang="en-GB" dirty="0">
+                    <a:sym typeface="Wingdings" panose="05000000000000000000" pitchFamily="2" charset="2"/>
+                  </a:rPr>
+                  <a:t>(</a:t>
+                </a:r>
+                <a:r>
+                  <a:rPr lang="en-GB" dirty="0" err="1">
+                    <a:sym typeface="Wingdings" panose="05000000000000000000" pitchFamily="2" charset="2"/>
+                  </a:rPr>
+                  <a:t>semena</a:t>
+                </a:r>
+                <a:r>
+                  <a:rPr lang="en-GB" dirty="0">
+                    <a:sym typeface="Wingdings" panose="05000000000000000000" pitchFamily="2" charset="2"/>
+                  </a:rPr>
+                  <a:t>[Q], Q)</a:t>
+                </a:r>
+              </a:p>
+              <a:p>
+                <a:pPr marL="3657600" lvl="8" indent="0">
+                  <a:buNone/>
+                </a:pPr>
+                <a:r>
+                  <a:rPr lang="en-GB" dirty="0">
+                    <a:sym typeface="Wingdings" panose="05000000000000000000" pitchFamily="2" charset="2"/>
+                  </a:rPr>
+                  <a:t>		TRUE -&gt; </a:t>
+                </a:r>
+                <a:r>
+                  <a:rPr lang="en-GB" sz="2400" dirty="0">
+                    <a:sym typeface="Wingdings" panose="05000000000000000000" pitchFamily="2" charset="2"/>
+                  </a:rPr>
+                  <a:t>Q </a:t>
+                </a:r>
+                <a:r>
+                  <a:rPr lang="en-GB" sz="2400" dirty="0" err="1">
+                    <a:sym typeface="Wingdings" panose="05000000000000000000" pitchFamily="2" charset="2"/>
+                  </a:rPr>
+                  <a:t>prebarvaj</a:t>
+                </a:r>
+                <a:r>
+                  <a:rPr lang="en-GB" sz="2400" dirty="0">
+                    <a:sym typeface="Wingdings" panose="05000000000000000000" pitchFamily="2" charset="2"/>
+                  </a:rPr>
+                  <a:t> v P</a:t>
+                </a:r>
+              </a:p>
+              <a:p>
+                <a:r>
+                  <a:rPr lang="en-GB" sz="2600" dirty="0" err="1">
+                    <a:sym typeface="Wingdings" panose="05000000000000000000" pitchFamily="2" charset="2"/>
+                  </a:rPr>
+                  <a:t>Časovna</a:t>
+                </a:r>
+                <a:r>
+                  <a:rPr lang="en-GB" sz="2600" dirty="0">
+                    <a:sym typeface="Wingdings" panose="05000000000000000000" pitchFamily="2" charset="2"/>
+                  </a:rPr>
+                  <a:t> </a:t>
+                </a:r>
+                <a:r>
+                  <a:rPr lang="en-GB" sz="2600" dirty="0" err="1">
+                    <a:sym typeface="Wingdings" panose="05000000000000000000" pitchFamily="2" charset="2"/>
+                  </a:rPr>
+                  <a:t>zahtevnost</a:t>
+                </a:r>
+                <a:r>
+                  <a:rPr lang="en-GB" sz="2600" dirty="0">
+                    <a:sym typeface="Wingdings" panose="05000000000000000000" pitchFamily="2" charset="2"/>
+                  </a:rPr>
+                  <a:t>: </a:t>
+                </a:r>
+                <a:r>
+                  <a:rPr lang="en-GB" sz="2400" dirty="0"/>
+                  <a:t>O(N^2 * </a:t>
+                </a:r>
+                <a14:m>
+                  <m:oMath xmlns:m="http://schemas.openxmlformats.org/officeDocument/2006/math">
+                    <m:sSub>
+                      <m:sSubPr>
+                        <m:ctrlPr>
+                          <a:rPr lang="en-GB" sz="2400" i="1" smtClean="0">
+                            <a:latin typeface="Cambria Math" panose="02040503050406030204" pitchFamily="18" charset="0"/>
+                          </a:rPr>
+                        </m:ctrlPr>
+                      </m:sSubPr>
+                      <m:e>
+                        <m:r>
+                          <a:rPr lang="en-GB" sz="2400" b="0" i="1" smtClean="0">
+                            <a:latin typeface="Cambria Math" panose="02040503050406030204" pitchFamily="18" charset="0"/>
+                          </a:rPr>
+                          <m:t>𝑙𝑜𝑔</m:t>
+                        </m:r>
+                      </m:e>
+                      <m:sub>
+                        <m:r>
+                          <a:rPr lang="en-GB" sz="2400" b="0" i="1" smtClean="0">
+                            <a:latin typeface="Cambria Math" panose="02040503050406030204" pitchFamily="18" charset="0"/>
+                          </a:rPr>
+                          <m:t>2</m:t>
+                        </m:r>
+                      </m:sub>
+                    </m:sSub>
+                  </m:oMath>
+                </a14:m>
+                <a:r>
+                  <a:rPr lang="en-GB" sz="2400" dirty="0"/>
+                  <a:t>(N))</a:t>
+                </a:r>
+                <a:endParaRPr lang="en-GB" sz="2600" dirty="0">
+                  <a:sym typeface="Wingdings" panose="05000000000000000000" pitchFamily="2" charset="2"/>
+                </a:endParaRPr>
+              </a:p>
+              <a:p>
+                <a:pPr marL="3657600" lvl="8" indent="0">
+                  <a:buNone/>
+                </a:pPr>
+                <a:endParaRPr lang="en-GB" dirty="0"/>
+              </a:p>
+            </p:txBody>
+          </p:sp>
+        </mc:Choice>
+        <mc:Fallback>
+          <p:sp>
+            <p:nvSpPr>
+              <p:cNvPr id="3" name="Content Placeholder 2">
+                <a:extLst>
+                  <a:ext uri="{FF2B5EF4-FFF2-40B4-BE49-F238E27FC236}">
+                    <a16:creationId xmlns:a16="http://schemas.microsoft.com/office/drawing/2014/main" id="{9CF6BB80-AE4F-49BB-9E5F-890FCDC24A34}"/>
+                  </a:ext>
+                </a:extLst>
+              </p:cNvPr>
+              <p:cNvSpPr>
+                <a:spLocks noGrp="1" noRot="1" noChangeAspect="1" noMove="1" noResize="1" noEditPoints="1" noAdjustHandles="1" noChangeArrowheads="1" noChangeShapeType="1" noTextEdit="1"/>
+              </p:cNvSpPr>
+              <p:nvPr>
+                <p:ph idx="1"/>
+              </p:nvPr>
+            </p:nvSpPr>
+            <p:spPr>
+              <a:xfrm>
+                <a:off x="838200" y="1523784"/>
+                <a:ext cx="10515600" cy="4904447"/>
+              </a:xfrm>
+              <a:blipFill>
+                <a:blip r:embed="rId2"/>
+                <a:stretch>
+                  <a:fillRect l="-1043" t="-2114" b="-871"/>
+                </a:stretch>
+              </a:blipFill>
+            </p:spPr>
+            <p:txBody>
+              <a:bodyPr/>
+              <a:lstStyle/>
+              <a:p>
+                <a:r>
+                  <a:rPr lang="en-GB">
+                    <a:noFill/>
+                  </a:rPr>
+                  <a:t> </a:t>
+                </a:r>
+              </a:p>
+            </p:txBody>
+          </p:sp>
+        </mc:Fallback>
+      </mc:AlternateContent>
+      <p:sp>
+        <p:nvSpPr>
+          <p:cNvPr id="4" name="Rectangle 3">
+            <a:extLst>
+              <a:ext uri="{FF2B5EF4-FFF2-40B4-BE49-F238E27FC236}">
+                <a16:creationId xmlns:a16="http://schemas.microsoft.com/office/drawing/2014/main" id="{E505AD2A-B962-46A6-A447-5975BAC6E551}"/>
+              </a:ext>
+            </a:extLst>
+          </p:cNvPr>
+          <p:cNvSpPr/>
+          <p:nvPr/>
+        </p:nvSpPr>
+        <p:spPr>
+          <a:xfrm>
+            <a:off x="4303776" y="3886844"/>
+            <a:ext cx="7050024" cy="936883"/>
+          </a:xfrm>
+          <a:prstGeom prst="rect">
+            <a:avLst/>
+          </a:prstGeom>
+          <a:solidFill>
+            <a:schemeClr val="bg1"/>
+          </a:solidFill>
+          <a:ln>
+            <a:solidFill>
+              <a:schemeClr val="bg1"/>
+            </a:solidFill>
+          </a:ln>
+        </p:spPr>
+        <p:style>
+          <a:lnRef idx="2">
+            <a:schemeClr val="accent1">
+              <a:shade val="50000"/>
+            </a:schemeClr>
+          </a:lnRef>
+          <a:fillRef idx="1">
+            <a:schemeClr val="accent1"/>
+          </a:fillRef>
+          <a:effectRef idx="0">
+            <a:schemeClr val="accent1"/>
+          </a:effectRef>
+          <a:fontRef idx="minor">
+            <a:schemeClr val="lt1"/>
+          </a:fontRef>
+        </p:style>
+        <p:txBody>
+          <a:bodyPr rtlCol="0" anchor="ctr"/>
           <a:lstStyle/>
           <a:p>
-            <a:r>
-              <a:rPr lang="en-GB" dirty="0" err="1"/>
-              <a:t>Algoritem</a:t>
-            </a:r>
-            <a:endParaRPr lang="en-GB" dirty="0"/>
+            <a:pPr algn="ctr"/>
+            <a:endParaRPr lang="en-GB"/>
+          </a:p>
+        </p:txBody>
+      </p:sp>
+      <p:sp>
+        <p:nvSpPr>
+          <p:cNvPr id="5" name="Rectangle 4">
+            <a:extLst>
+              <a:ext uri="{FF2B5EF4-FFF2-40B4-BE49-F238E27FC236}">
+                <a16:creationId xmlns:a16="http://schemas.microsoft.com/office/drawing/2014/main" id="{15157D17-1925-433A-8C05-119A01BBBF8B}"/>
+              </a:ext>
+            </a:extLst>
+          </p:cNvPr>
+          <p:cNvSpPr/>
+          <p:nvPr/>
+        </p:nvSpPr>
+        <p:spPr>
+          <a:xfrm>
+            <a:off x="1371600" y="4681728"/>
+            <a:ext cx="2761488" cy="411262"/>
+          </a:xfrm>
+          <a:prstGeom prst="rect">
+            <a:avLst/>
+          </a:prstGeom>
+          <a:solidFill>
+            <a:schemeClr val="bg1"/>
+          </a:solidFill>
+          <a:ln>
+            <a:solidFill>
+              <a:schemeClr val="bg1"/>
+            </a:solidFill>
+          </a:ln>
+        </p:spPr>
+        <p:style>
+          <a:lnRef idx="2">
+            <a:schemeClr val="accent1">
+              <a:shade val="50000"/>
+            </a:schemeClr>
+          </a:lnRef>
+          <a:fillRef idx="1">
+            <a:schemeClr val="accent1"/>
+          </a:fillRef>
+          <a:effectRef idx="0">
+            <a:schemeClr val="accent1"/>
+          </a:effectRef>
+          <a:fontRef idx="minor">
+            <a:schemeClr val="lt1"/>
+          </a:fontRef>
+        </p:style>
+        <p:txBody>
+          <a:bodyPr rtlCol="0" anchor="ctr"/>
+          <a:lstStyle/>
+          <a:p>
+            <a:pPr algn="ctr"/>
+            <a:endParaRPr lang="en-GB"/>
+          </a:p>
+        </p:txBody>
+      </p:sp>
+      <p:sp>
+        <p:nvSpPr>
+          <p:cNvPr id="7" name="Rectangle 6">
+            <a:extLst>
+              <a:ext uri="{FF2B5EF4-FFF2-40B4-BE49-F238E27FC236}">
+                <a16:creationId xmlns:a16="http://schemas.microsoft.com/office/drawing/2014/main" id="{E9FB876F-A519-4CE1-9D77-34DC38B4EA5B}"/>
+              </a:ext>
+            </a:extLst>
+          </p:cNvPr>
+          <p:cNvSpPr/>
+          <p:nvPr/>
+        </p:nvSpPr>
+        <p:spPr>
+          <a:xfrm>
+            <a:off x="4133088" y="4887359"/>
+            <a:ext cx="7050024" cy="936883"/>
+          </a:xfrm>
+          <a:prstGeom prst="rect">
+            <a:avLst/>
+          </a:prstGeom>
+          <a:solidFill>
+            <a:schemeClr val="bg1"/>
+          </a:solidFill>
+          <a:ln>
+            <a:solidFill>
+              <a:schemeClr val="bg1"/>
+            </a:solidFill>
+          </a:ln>
+        </p:spPr>
+        <p:style>
+          <a:lnRef idx="2">
+            <a:schemeClr val="accent1">
+              <a:shade val="50000"/>
+            </a:schemeClr>
+          </a:lnRef>
+          <a:fillRef idx="1">
+            <a:schemeClr val="accent1"/>
+          </a:fillRef>
+          <a:effectRef idx="0">
+            <a:schemeClr val="accent1"/>
+          </a:effectRef>
+          <a:fontRef idx="minor">
+            <a:schemeClr val="lt1"/>
+          </a:fontRef>
+        </p:style>
+        <p:txBody>
+          <a:bodyPr rtlCol="0" anchor="ctr"/>
+          <a:lstStyle/>
+          <a:p>
+            <a:pPr algn="ctr"/>
+            <a:endParaRPr lang="en-GB"/>
           </a:p>
         </p:txBody>
       </p:sp>
     </p:spTree>
     <p:extLst>
       <p:ext uri="{BB962C8B-B14F-4D97-AF65-F5344CB8AC3E}">
-        <p14:creationId xmlns:p14="http://schemas.microsoft.com/office/powerpoint/2010/main" val="2149885589"/>
+        <p14:creationId xmlns:p14="http://schemas.microsoft.com/office/powerpoint/2010/main" val="2127496846"/>
       </p:ext>
     </p:extLst>
   </p:cSld>
   <p:clrMapOvr>
     <a:masterClrMapping/>
   </p:clrMapOvr>
+  <p:timing>
+    <p:tnLst>
+      <p:par>
+        <p:cTn id="1" dur="indefinite" restart="never" nodeType="tmRoot">
+          <p:childTnLst>
+            <p:seq concurrent="1" nextAc="seek">
+              <p:cTn id="2" dur="indefinite" nodeType="mainSeq">
+                <p:childTnLst>
+                  <p:par>
+                    <p:cTn id="3" fill="hold">
+                      <p:stCondLst>
+                        <p:cond delay="indefinite"/>
+                      </p:stCondLst>
+                      <p:childTnLst>
+                        <p:par>
+                          <p:cTn id="4" fill="hold">
+                            <p:stCondLst>
+                              <p:cond delay="0"/>
+                            </p:stCondLst>
+                            <p:childTnLst>
+                              <p:par>
+                                <p:cTn id="5" presetID="1" presetClass="entr" presetSubtype="0" fill="hold" nodeType="clickEffect">
+                                  <p:stCondLst>
+                                    <p:cond delay="0"/>
+                                  </p:stCondLst>
+                                  <p:childTnLst>
+                                    <p:set>
+                                      <p:cBhvr>
+                                        <p:cTn id="6" dur="1" fill="hold">
+                                          <p:stCondLst>
+                                            <p:cond delay="0"/>
+                                          </p:stCondLst>
+                                        </p:cTn>
+                                        <p:tgtEl>
+                                          <p:spTgt spid="3">
+                                            <p:txEl>
+                                              <p:pRg st="0" end="0"/>
+                                            </p:txEl>
+                                          </p:spTgt>
+                                        </p:tgtEl>
+                                        <p:attrNameLst>
+                                          <p:attrName>style.visibility</p:attrName>
+                                        </p:attrNameLst>
+                                      </p:cBhvr>
+                                      <p:to>
+                                        <p:strVal val="visible"/>
+                                      </p:to>
+                                    </p:set>
+                                  </p:childTnLst>
+                                </p:cTn>
+                              </p:par>
+                            </p:childTnLst>
+                          </p:cTn>
+                        </p:par>
+                      </p:childTnLst>
+                    </p:cTn>
+                  </p:par>
+                  <p:par>
+                    <p:cTn id="7" fill="hold">
+                      <p:stCondLst>
+                        <p:cond delay="indefinite"/>
+                      </p:stCondLst>
+                      <p:childTnLst>
+                        <p:par>
+                          <p:cTn id="8" fill="hold">
+                            <p:stCondLst>
+                              <p:cond delay="0"/>
+                            </p:stCondLst>
+                            <p:childTnLst>
+                              <p:par>
+                                <p:cTn id="9" presetID="1" presetClass="entr" presetSubtype="0" fill="hold" nodeType="clickEffect">
+                                  <p:stCondLst>
+                                    <p:cond delay="0"/>
+                                  </p:stCondLst>
+                                  <p:childTnLst>
+                                    <p:set>
+                                      <p:cBhvr>
+                                        <p:cTn id="10" dur="1" fill="hold">
+                                          <p:stCondLst>
+                                            <p:cond delay="0"/>
+                                          </p:stCondLst>
+                                        </p:cTn>
+                                        <p:tgtEl>
+                                          <p:spTgt spid="3">
+                                            <p:txEl>
+                                              <p:pRg st="2" end="2"/>
+                                            </p:txEl>
+                                          </p:spTgt>
+                                        </p:tgtEl>
+                                        <p:attrNameLst>
+                                          <p:attrName>style.visibility</p:attrName>
+                                        </p:attrNameLst>
+                                      </p:cBhvr>
+                                      <p:to>
+                                        <p:strVal val="visible"/>
+                                      </p:to>
+                                    </p:set>
+                                  </p:childTnLst>
+                                </p:cTn>
+                              </p:par>
+                              <p:par>
+                                <p:cTn id="11" presetID="1" presetClass="entr" presetSubtype="0" fill="hold" nodeType="withEffect">
+                                  <p:stCondLst>
+                                    <p:cond delay="0"/>
+                                  </p:stCondLst>
+                                  <p:childTnLst>
+                                    <p:set>
+                                      <p:cBhvr>
+                                        <p:cTn id="12" dur="1" fill="hold">
+                                          <p:stCondLst>
+                                            <p:cond delay="0"/>
+                                          </p:stCondLst>
+                                        </p:cTn>
+                                        <p:tgtEl>
+                                          <p:spTgt spid="3">
+                                            <p:txEl>
+                                              <p:pRg st="3" end="3"/>
+                                            </p:txEl>
+                                          </p:spTgt>
+                                        </p:tgtEl>
+                                        <p:attrNameLst>
+                                          <p:attrName>style.visibility</p:attrName>
+                                        </p:attrNameLst>
+                                      </p:cBhvr>
+                                      <p:to>
+                                        <p:strVal val="visible"/>
+                                      </p:to>
+                                    </p:set>
+                                  </p:childTnLst>
+                                </p:cTn>
+                              </p:par>
+                            </p:childTnLst>
+                          </p:cTn>
+                        </p:par>
+                      </p:childTnLst>
+                    </p:cTn>
+                  </p:par>
+                  <p:par>
+                    <p:cTn id="13" fill="hold">
+                      <p:stCondLst>
+                        <p:cond delay="indefinite"/>
+                      </p:stCondLst>
+                      <p:childTnLst>
+                        <p:par>
+                          <p:cTn id="14" fill="hold">
+                            <p:stCondLst>
+                              <p:cond delay="0"/>
+                            </p:stCondLst>
+                            <p:childTnLst>
+                              <p:par>
+                                <p:cTn id="15" presetID="1" presetClass="entr" presetSubtype="0" fill="hold" nodeType="clickEffect">
+                                  <p:stCondLst>
+                                    <p:cond delay="0"/>
+                                  </p:stCondLst>
+                                  <p:childTnLst>
+                                    <p:set>
+                                      <p:cBhvr>
+                                        <p:cTn id="16" dur="1" fill="hold">
+                                          <p:stCondLst>
+                                            <p:cond delay="0"/>
+                                          </p:stCondLst>
+                                        </p:cTn>
+                                        <p:tgtEl>
+                                          <p:spTgt spid="3">
+                                            <p:txEl>
+                                              <p:pRg st="5" end="5"/>
+                                            </p:txEl>
+                                          </p:spTgt>
+                                        </p:tgtEl>
+                                        <p:attrNameLst>
+                                          <p:attrName>style.visibility</p:attrName>
+                                        </p:attrNameLst>
+                                      </p:cBhvr>
+                                      <p:to>
+                                        <p:strVal val="visible"/>
+                                      </p:to>
+                                    </p:set>
+                                  </p:childTnLst>
+                                </p:cTn>
+                              </p:par>
+                            </p:childTnLst>
+                          </p:cTn>
+                        </p:par>
+                      </p:childTnLst>
+                    </p:cTn>
+                  </p:par>
+                  <p:par>
+                    <p:cTn id="17" fill="hold">
+                      <p:stCondLst>
+                        <p:cond delay="indefinite"/>
+                      </p:stCondLst>
+                      <p:childTnLst>
+                        <p:par>
+                          <p:cTn id="18" fill="hold">
+                            <p:stCondLst>
+                              <p:cond delay="0"/>
+                            </p:stCondLst>
+                            <p:childTnLst>
+                              <p:par>
+                                <p:cTn id="19" presetID="1" presetClass="entr" presetSubtype="0" fill="hold" nodeType="clickEffect">
+                                  <p:stCondLst>
+                                    <p:cond delay="0"/>
+                                  </p:stCondLst>
+                                  <p:childTnLst>
+                                    <p:set>
+                                      <p:cBhvr>
+                                        <p:cTn id="20" dur="1" fill="hold">
+                                          <p:stCondLst>
+                                            <p:cond delay="0"/>
+                                          </p:stCondLst>
+                                        </p:cTn>
+                                        <p:tgtEl>
+                                          <p:spTgt spid="3">
+                                            <p:txEl>
+                                              <p:pRg st="6" end="6"/>
+                                            </p:txEl>
+                                          </p:spTgt>
+                                        </p:tgtEl>
+                                        <p:attrNameLst>
+                                          <p:attrName>style.visibility</p:attrName>
+                                        </p:attrNameLst>
+                                      </p:cBhvr>
+                                      <p:to>
+                                        <p:strVal val="visible"/>
+                                      </p:to>
+                                    </p:set>
+                                  </p:childTnLst>
+                                </p:cTn>
+                              </p:par>
+                              <p:par>
+                                <p:cTn id="21" presetID="1" presetClass="entr" presetSubtype="0" fill="hold" nodeType="withEffect">
+                                  <p:stCondLst>
+                                    <p:cond delay="0"/>
+                                  </p:stCondLst>
+                                  <p:childTnLst>
+                                    <p:set>
+                                      <p:cBhvr>
+                                        <p:cTn id="22" dur="1" fill="hold">
+                                          <p:stCondLst>
+                                            <p:cond delay="0"/>
+                                          </p:stCondLst>
+                                        </p:cTn>
+                                        <p:tgtEl>
+                                          <p:spTgt spid="3">
+                                            <p:txEl>
+                                              <p:pRg st="7" end="7"/>
+                                            </p:txEl>
+                                          </p:spTgt>
+                                        </p:tgtEl>
+                                        <p:attrNameLst>
+                                          <p:attrName>style.visibility</p:attrName>
+                                        </p:attrNameLst>
+                                      </p:cBhvr>
+                                      <p:to>
+                                        <p:strVal val="visible"/>
+                                      </p:to>
+                                    </p:set>
+                                  </p:childTnLst>
+                                </p:cTn>
+                              </p:par>
+                            </p:childTnLst>
+                          </p:cTn>
+                        </p:par>
+                      </p:childTnLst>
+                    </p:cTn>
+                  </p:par>
+                  <p:par>
+                    <p:cTn id="23" fill="hold">
+                      <p:stCondLst>
+                        <p:cond delay="indefinite"/>
+                      </p:stCondLst>
+                      <p:childTnLst>
+                        <p:par>
+                          <p:cTn id="24" fill="hold">
+                            <p:stCondLst>
+                              <p:cond delay="0"/>
+                            </p:stCondLst>
+                            <p:childTnLst>
+                              <p:par>
+                                <p:cTn id="25" presetID="1" presetClass="exit" presetSubtype="0" fill="hold" grpId="0" nodeType="clickEffect">
+                                  <p:stCondLst>
+                                    <p:cond delay="0"/>
+                                  </p:stCondLst>
+                                  <p:childTnLst>
+                                    <p:set>
+                                      <p:cBhvr>
+                                        <p:cTn id="26" dur="1" fill="hold">
+                                          <p:stCondLst>
+                                            <p:cond delay="0"/>
+                                          </p:stCondLst>
+                                        </p:cTn>
+                                        <p:tgtEl>
+                                          <p:spTgt spid="4"/>
+                                        </p:tgtEl>
+                                        <p:attrNameLst>
+                                          <p:attrName>style.visibility</p:attrName>
+                                        </p:attrNameLst>
+                                      </p:cBhvr>
+                                      <p:to>
+                                        <p:strVal val="hidden"/>
+                                      </p:to>
+                                    </p:set>
+                                  </p:childTnLst>
+                                </p:cTn>
+                              </p:par>
+                              <p:par>
+                                <p:cTn id="27" presetID="1" presetClass="exit" presetSubtype="0" fill="hold" grpId="0" nodeType="withEffect">
+                                  <p:stCondLst>
+                                    <p:cond delay="0"/>
+                                  </p:stCondLst>
+                                  <p:childTnLst>
+                                    <p:set>
+                                      <p:cBhvr>
+                                        <p:cTn id="28" dur="1" fill="hold">
+                                          <p:stCondLst>
+                                            <p:cond delay="0"/>
+                                          </p:stCondLst>
+                                        </p:cTn>
+                                        <p:tgtEl>
+                                          <p:spTgt spid="5"/>
+                                        </p:tgtEl>
+                                        <p:attrNameLst>
+                                          <p:attrName>style.visibility</p:attrName>
+                                        </p:attrNameLst>
+                                      </p:cBhvr>
+                                      <p:to>
+                                        <p:strVal val="hidden"/>
+                                      </p:to>
+                                    </p:set>
+                                  </p:childTnLst>
+                                </p:cTn>
+                              </p:par>
+                            </p:childTnLst>
+                          </p:cTn>
+                        </p:par>
+                      </p:childTnLst>
+                    </p:cTn>
+                  </p:par>
+                  <p:par>
+                    <p:cTn id="29" fill="hold">
+                      <p:stCondLst>
+                        <p:cond delay="indefinite"/>
+                      </p:stCondLst>
+                      <p:childTnLst>
+                        <p:par>
+                          <p:cTn id="30" fill="hold">
+                            <p:stCondLst>
+                              <p:cond delay="0"/>
+                            </p:stCondLst>
+                            <p:childTnLst>
+                              <p:par>
+                                <p:cTn id="31" presetID="1" presetClass="exit" presetSubtype="0" fill="hold" grpId="0" nodeType="clickEffect">
+                                  <p:stCondLst>
+                                    <p:cond delay="0"/>
+                                  </p:stCondLst>
+                                  <p:childTnLst>
+                                    <p:set>
+                                      <p:cBhvr>
+                                        <p:cTn id="32" dur="1" fill="hold">
+                                          <p:stCondLst>
+                                            <p:cond delay="0"/>
+                                          </p:stCondLst>
+                                        </p:cTn>
+                                        <p:tgtEl>
+                                          <p:spTgt spid="7"/>
+                                        </p:tgtEl>
+                                        <p:attrNameLst>
+                                          <p:attrName>style.visibility</p:attrName>
+                                        </p:attrNameLst>
+                                      </p:cBhvr>
+                                      <p:to>
+                                        <p:strVal val="hidden"/>
+                                      </p:to>
+                                    </p:set>
+                                  </p:childTnLst>
+                                </p:cTn>
+                              </p:par>
+                            </p:childTnLst>
+                          </p:cTn>
+                        </p:par>
+                      </p:childTnLst>
+                    </p:cTn>
+                  </p:par>
+                  <p:par>
+                    <p:cTn id="33" fill="hold">
+                      <p:stCondLst>
+                        <p:cond delay="indefinite"/>
+                      </p:stCondLst>
+                      <p:childTnLst>
+                        <p:par>
+                          <p:cTn id="34" fill="hold">
+                            <p:stCondLst>
+                              <p:cond delay="0"/>
+                            </p:stCondLst>
+                            <p:childTnLst>
+                              <p:par>
+                                <p:cTn id="35" presetID="1" presetClass="entr" presetSubtype="0" fill="hold" nodeType="clickEffect">
+                                  <p:stCondLst>
+                                    <p:cond delay="0"/>
+                                  </p:stCondLst>
+                                  <p:childTnLst>
+                                    <p:set>
+                                      <p:cBhvr>
+                                        <p:cTn id="36" dur="1" fill="hold">
+                                          <p:stCondLst>
+                                            <p:cond delay="0"/>
+                                          </p:stCondLst>
+                                        </p:cTn>
+                                        <p:tgtEl>
+                                          <p:spTgt spid="3">
+                                            <p:txEl>
+                                              <p:pRg st="9" end="9"/>
+                                            </p:txEl>
+                                          </p:spTgt>
+                                        </p:tgtEl>
+                                        <p:attrNameLst>
+                                          <p:attrName>style.visibility</p:attrName>
+                                        </p:attrNameLst>
+                                      </p:cBhvr>
+                                      <p:to>
+                                        <p:strVal val="visible"/>
+                                      </p:to>
+                                    </p:set>
+                                  </p:childTnLst>
+                                </p:cTn>
+                              </p:par>
+                            </p:childTnLst>
+                          </p:cTn>
+                        </p:par>
+                      </p:childTnLst>
+                    </p:cTn>
+                  </p:par>
+                </p:childTnLst>
+              </p:cTn>
+              <p:prevCondLst>
+                <p:cond evt="onPrev" delay="0">
+                  <p:tgtEl>
+                    <p:sldTgt/>
+                  </p:tgtEl>
+                </p:cond>
+              </p:prevCondLst>
+              <p:nextCondLst>
+                <p:cond evt="onNext" delay="0">
+                  <p:tgtEl>
+                    <p:sldTgt/>
+                  </p:tgtEl>
+                </p:cond>
+              </p:nextCondLst>
+            </p:seq>
+          </p:childTnLst>
+        </p:cTn>
+      </p:par>
+    </p:tnLst>
+    <p:bldLst>
+      <p:bldP spid="4" grpId="0" animBg="1"/>
+      <p:bldP spid="5" grpId="0" animBg="1"/>
+      <p:bldP spid="7" grpId="0" animBg="1"/>
+    </p:bldLst>
+  </p:timing>
 </p:sld>
 </file>
 
@@ -4166,82 +7128,325 @@
           <a:chExt cx="0" cy="0"/>
         </a:xfrm>
       </p:grpSpPr>
-      <p:sp>
-        <p:nvSpPr>
-          <p:cNvPr id="2" name="Title 1">
-            <a:extLst>
-              <a:ext uri="{FF2B5EF4-FFF2-40B4-BE49-F238E27FC236}">
-                <a16:creationId xmlns:a16="http://schemas.microsoft.com/office/drawing/2014/main" id="{2A6D3955-70A8-4A0E-9265-F698F028F026}"/>
-              </a:ext>
-            </a:extLst>
-          </p:cNvPr>
-          <p:cNvSpPr>
-            <a:spLocks noGrp="1"/>
-          </p:cNvSpPr>
-          <p:nvPr>
-            <p:ph type="title"/>
-          </p:nvPr>
-        </p:nvSpPr>
-        <p:spPr/>
-        <p:txBody>
-          <a:bodyPr/>
-          <a:lstStyle/>
-          <a:p>
-            <a:r>
-              <a:rPr lang="en-GB" dirty="0" err="1"/>
-              <a:t>Delaunajeva</a:t>
-            </a:r>
-            <a:r>
-              <a:rPr lang="en-GB" dirty="0"/>
-              <a:t> </a:t>
-            </a:r>
-            <a:r>
-              <a:rPr lang="en-GB" dirty="0" err="1"/>
-              <a:t>triangulacija</a:t>
-            </a:r>
-            <a:endParaRPr lang="en-GB" dirty="0"/>
-          </a:p>
-        </p:txBody>
-      </p:sp>
-      <p:sp>
-        <p:nvSpPr>
-          <p:cNvPr id="3" name="Content Placeholder 2">
-            <a:extLst>
-              <a:ext uri="{FF2B5EF4-FFF2-40B4-BE49-F238E27FC236}">
-                <a16:creationId xmlns:a16="http://schemas.microsoft.com/office/drawing/2014/main" id="{C8B64E5B-109D-4C2B-984D-9569CEDE5709}"/>
-              </a:ext>
-            </a:extLst>
-          </p:cNvPr>
-          <p:cNvSpPr>
-            <a:spLocks noGrp="1"/>
-          </p:cNvSpPr>
-          <p:nvPr>
-            <p:ph idx="1"/>
-          </p:nvPr>
-        </p:nvSpPr>
-        <p:spPr/>
-        <p:txBody>
-          <a:bodyPr/>
-          <a:lstStyle/>
-          <a:p>
-            <a:r>
-              <a:rPr lang="en-GB" dirty="0" err="1"/>
-              <a:t>Algoritem</a:t>
-            </a:r>
-            <a:endParaRPr lang="en-GB" dirty="0"/>
-          </a:p>
-        </p:txBody>
-      </p:sp>
+      <p:pic>
+        <p:nvPicPr>
+          <p:cNvPr id="11" name="Picture 10">
+            <a:extLst>
+              <a:ext uri="{FF2B5EF4-FFF2-40B4-BE49-F238E27FC236}">
+                <a16:creationId xmlns:a16="http://schemas.microsoft.com/office/drawing/2014/main" id="{6C2A0088-B696-4E88-B591-48C4895D543D}"/>
+              </a:ext>
+            </a:extLst>
+          </p:cNvPr>
+          <p:cNvPicPr>
+            <a:picLocks noChangeAspect="1"/>
+          </p:cNvPicPr>
+          <p:nvPr/>
+        </p:nvPicPr>
+        <p:blipFill>
+          <a:blip r:embed="rId2">
+            <a:extLst>
+              <a:ext uri="{28A0092B-C50C-407E-A947-70E740481C1C}">
+                <a14:useLocalDpi xmlns:a14="http://schemas.microsoft.com/office/drawing/2010/main" val="0"/>
+              </a:ext>
+            </a:extLst>
+          </a:blip>
+          <a:stretch>
+            <a:fillRect/>
+          </a:stretch>
+        </p:blipFill>
+        <p:spPr>
+          <a:xfrm>
+            <a:off x="1596000" y="54000"/>
+            <a:ext cx="9000000" cy="6750000"/>
+          </a:xfrm>
+          <a:prstGeom prst="rect">
+            <a:avLst/>
+          </a:prstGeom>
+        </p:spPr>
+      </p:pic>
+      <p:pic>
+        <p:nvPicPr>
+          <p:cNvPr id="13" name="Picture 12">
+            <a:extLst>
+              <a:ext uri="{FF2B5EF4-FFF2-40B4-BE49-F238E27FC236}">
+                <a16:creationId xmlns:a16="http://schemas.microsoft.com/office/drawing/2014/main" id="{860990D0-67C4-4301-8126-6688B53AFA3D}"/>
+              </a:ext>
+            </a:extLst>
+          </p:cNvPr>
+          <p:cNvPicPr>
+            <a:picLocks noChangeAspect="1"/>
+          </p:cNvPicPr>
+          <p:nvPr/>
+        </p:nvPicPr>
+        <p:blipFill>
+          <a:blip r:embed="rId3">
+            <a:extLst>
+              <a:ext uri="{28A0092B-C50C-407E-A947-70E740481C1C}">
+                <a14:useLocalDpi xmlns:a14="http://schemas.microsoft.com/office/drawing/2010/main" val="0"/>
+              </a:ext>
+            </a:extLst>
+          </a:blip>
+          <a:stretch>
+            <a:fillRect/>
+          </a:stretch>
+        </p:blipFill>
+        <p:spPr>
+          <a:xfrm>
+            <a:off x="1596000" y="54000"/>
+            <a:ext cx="9000000" cy="6750000"/>
+          </a:xfrm>
+          <a:prstGeom prst="rect">
+            <a:avLst/>
+          </a:prstGeom>
+        </p:spPr>
+      </p:pic>
+      <p:pic>
+        <p:nvPicPr>
+          <p:cNvPr id="15" name="Picture 14">
+            <a:extLst>
+              <a:ext uri="{FF2B5EF4-FFF2-40B4-BE49-F238E27FC236}">
+                <a16:creationId xmlns:a16="http://schemas.microsoft.com/office/drawing/2014/main" id="{0298F1BA-6BBB-45C3-8B08-B9F601A942CB}"/>
+              </a:ext>
+            </a:extLst>
+          </p:cNvPr>
+          <p:cNvPicPr>
+            <a:picLocks noChangeAspect="1"/>
+          </p:cNvPicPr>
+          <p:nvPr/>
+        </p:nvPicPr>
+        <p:blipFill>
+          <a:blip r:embed="rId4">
+            <a:extLst>
+              <a:ext uri="{28A0092B-C50C-407E-A947-70E740481C1C}">
+                <a14:useLocalDpi xmlns:a14="http://schemas.microsoft.com/office/drawing/2010/main" val="0"/>
+              </a:ext>
+            </a:extLst>
+          </a:blip>
+          <a:stretch>
+            <a:fillRect/>
+          </a:stretch>
+        </p:blipFill>
+        <p:spPr>
+          <a:xfrm>
+            <a:off x="1596000" y="54000"/>
+            <a:ext cx="9000000" cy="6750000"/>
+          </a:xfrm>
+          <a:prstGeom prst="rect">
+            <a:avLst/>
+          </a:prstGeom>
+        </p:spPr>
+      </p:pic>
+      <p:pic>
+        <p:nvPicPr>
+          <p:cNvPr id="17" name="Picture 16">
+            <a:extLst>
+              <a:ext uri="{FF2B5EF4-FFF2-40B4-BE49-F238E27FC236}">
+                <a16:creationId xmlns:a16="http://schemas.microsoft.com/office/drawing/2014/main" id="{AA13C34B-2957-4489-8E07-0F677CE94636}"/>
+              </a:ext>
+            </a:extLst>
+          </p:cNvPr>
+          <p:cNvPicPr>
+            <a:picLocks noChangeAspect="1"/>
+          </p:cNvPicPr>
+          <p:nvPr/>
+        </p:nvPicPr>
+        <p:blipFill>
+          <a:blip r:embed="rId5">
+            <a:extLst>
+              <a:ext uri="{28A0092B-C50C-407E-A947-70E740481C1C}">
+                <a14:useLocalDpi xmlns:a14="http://schemas.microsoft.com/office/drawing/2010/main" val="0"/>
+              </a:ext>
+            </a:extLst>
+          </a:blip>
+          <a:stretch>
+            <a:fillRect/>
+          </a:stretch>
+        </p:blipFill>
+        <p:spPr>
+          <a:xfrm>
+            <a:off x="1596000" y="54000"/>
+            <a:ext cx="9000000" cy="6750000"/>
+          </a:xfrm>
+          <a:prstGeom prst="rect">
+            <a:avLst/>
+          </a:prstGeom>
+        </p:spPr>
+      </p:pic>
     </p:spTree>
     <p:extLst>
       <p:ext uri="{BB962C8B-B14F-4D97-AF65-F5344CB8AC3E}">
-        <p14:creationId xmlns:p14="http://schemas.microsoft.com/office/powerpoint/2010/main" val="3273298054"/>
+        <p14:creationId xmlns:p14="http://schemas.microsoft.com/office/powerpoint/2010/main" val="1414344838"/>
       </p:ext>
     </p:extLst>
   </p:cSld>
   <p:clrMapOvr>
     <a:masterClrMapping/>
   </p:clrMapOvr>
+  <p:timing>
+    <p:tnLst>
+      <p:par>
+        <p:cTn id="1" dur="indefinite" restart="never" nodeType="tmRoot">
+          <p:childTnLst>
+            <p:seq concurrent="1" nextAc="seek">
+              <p:cTn id="2" dur="indefinite" nodeType="mainSeq">
+                <p:childTnLst>
+                  <p:par>
+                    <p:cTn id="3" fill="hold">
+                      <p:stCondLst>
+                        <p:cond delay="indefinite"/>
+                      </p:stCondLst>
+                      <p:childTnLst>
+                        <p:par>
+                          <p:cTn id="4" fill="hold">
+                            <p:stCondLst>
+                              <p:cond delay="0"/>
+                            </p:stCondLst>
+                            <p:childTnLst>
+                              <p:par>
+                                <p:cTn id="5" presetID="1" presetClass="entr" presetSubtype="0" fill="hold" nodeType="clickEffect">
+                                  <p:stCondLst>
+                                    <p:cond delay="0"/>
+                                  </p:stCondLst>
+                                  <p:childTnLst>
+                                    <p:set>
+                                      <p:cBhvr>
+                                        <p:cTn id="6" dur="1" fill="hold">
+                                          <p:stCondLst>
+                                            <p:cond delay="0"/>
+                                          </p:stCondLst>
+                                        </p:cTn>
+                                        <p:tgtEl>
+                                          <p:spTgt spid="13"/>
+                                        </p:tgtEl>
+                                        <p:attrNameLst>
+                                          <p:attrName>style.visibility</p:attrName>
+                                        </p:attrNameLst>
+                                      </p:cBhvr>
+                                      <p:to>
+                                        <p:strVal val="visible"/>
+                                      </p:to>
+                                    </p:set>
+                                  </p:childTnLst>
+                                </p:cTn>
+                              </p:par>
+                            </p:childTnLst>
+                          </p:cTn>
+                        </p:par>
+                      </p:childTnLst>
+                    </p:cTn>
+                  </p:par>
+                  <p:par>
+                    <p:cTn id="7" fill="hold">
+                      <p:stCondLst>
+                        <p:cond delay="indefinite"/>
+                      </p:stCondLst>
+                      <p:childTnLst>
+                        <p:par>
+                          <p:cTn id="8" fill="hold">
+                            <p:stCondLst>
+                              <p:cond delay="0"/>
+                            </p:stCondLst>
+                            <p:childTnLst>
+                              <p:par>
+                                <p:cTn id="9" presetID="1" presetClass="entr" presetSubtype="0" fill="hold" nodeType="clickEffect">
+                                  <p:stCondLst>
+                                    <p:cond delay="0"/>
+                                  </p:stCondLst>
+                                  <p:childTnLst>
+                                    <p:set>
+                                      <p:cBhvr>
+                                        <p:cTn id="10" dur="1" fill="hold">
+                                          <p:stCondLst>
+                                            <p:cond delay="0"/>
+                                          </p:stCondLst>
+                                        </p:cTn>
+                                        <p:tgtEl>
+                                          <p:spTgt spid="15"/>
+                                        </p:tgtEl>
+                                        <p:attrNameLst>
+                                          <p:attrName>style.visibility</p:attrName>
+                                        </p:attrNameLst>
+                                      </p:cBhvr>
+                                      <p:to>
+                                        <p:strVal val="visible"/>
+                                      </p:to>
+                                    </p:set>
+                                  </p:childTnLst>
+                                </p:cTn>
+                              </p:par>
+                            </p:childTnLst>
+                          </p:cTn>
+                        </p:par>
+                      </p:childTnLst>
+                    </p:cTn>
+                  </p:par>
+                  <p:par>
+                    <p:cTn id="11" fill="hold">
+                      <p:stCondLst>
+                        <p:cond delay="indefinite"/>
+                      </p:stCondLst>
+                      <p:childTnLst>
+                        <p:par>
+                          <p:cTn id="12" fill="hold">
+                            <p:stCondLst>
+                              <p:cond delay="0"/>
+                            </p:stCondLst>
+                            <p:childTnLst>
+                              <p:par>
+                                <p:cTn id="13" presetID="1" presetClass="entr" presetSubtype="0" fill="hold" nodeType="clickEffect">
+                                  <p:stCondLst>
+                                    <p:cond delay="0"/>
+                                  </p:stCondLst>
+                                  <p:childTnLst>
+                                    <p:set>
+                                      <p:cBhvr>
+                                        <p:cTn id="14" dur="1" fill="hold">
+                                          <p:stCondLst>
+                                            <p:cond delay="0"/>
+                                          </p:stCondLst>
+                                        </p:cTn>
+                                        <p:tgtEl>
+                                          <p:spTgt spid="17"/>
+                                        </p:tgtEl>
+                                        <p:attrNameLst>
+                                          <p:attrName>style.visibility</p:attrName>
+                                        </p:attrNameLst>
+                                      </p:cBhvr>
+                                      <p:to>
+                                        <p:strVal val="visible"/>
+                                      </p:to>
+                                    </p:set>
+                                  </p:childTnLst>
+                                </p:cTn>
+                              </p:par>
+                            </p:childTnLst>
+                          </p:cTn>
+                        </p:par>
+                      </p:childTnLst>
+                    </p:cTn>
+                  </p:par>
+                </p:childTnLst>
+              </p:cTn>
+              <p:prevCondLst>
+                <p:cond evt="onPrev" delay="0">
+                  <p:tgtEl>
+                    <p:sldTgt/>
+                  </p:tgtEl>
+                </p:cond>
+              </p:prevCondLst>
+              <p:nextCondLst>
+                <p:cond evt="onNext" delay="0">
+                  <p:tgtEl>
+                    <p:sldTgt/>
+                  </p:tgtEl>
+                </p:cond>
+              </p:nextCondLst>
+            </p:seq>
+          </p:childTnLst>
+        </p:cTn>
+      </p:par>
+    </p:tnLst>
+  </p:timing>
 </p:sld>
 </file>
 
@@ -4262,78 +7467,406 @@
           <a:chExt cx="0" cy="0"/>
         </a:xfrm>
       </p:grpSpPr>
-      <p:sp>
-        <p:nvSpPr>
-          <p:cNvPr id="2" name="Title 1">
-            <a:extLst>
-              <a:ext uri="{FF2B5EF4-FFF2-40B4-BE49-F238E27FC236}">
-                <a16:creationId xmlns:a16="http://schemas.microsoft.com/office/drawing/2014/main" id="{A0EAE73B-6F8B-4BB8-A42B-92532DB8443D}"/>
-              </a:ext>
-            </a:extLst>
-          </p:cNvPr>
-          <p:cNvSpPr>
-            <a:spLocks noGrp="1"/>
-          </p:cNvSpPr>
-          <p:nvPr>
-            <p:ph type="title"/>
-          </p:nvPr>
-        </p:nvSpPr>
-        <p:spPr/>
-        <p:txBody>
-          <a:bodyPr/>
-          <a:lstStyle/>
-          <a:p>
-            <a:r>
-              <a:rPr lang="en-GB" dirty="0" err="1"/>
-              <a:t>Povezovanje</a:t>
-            </a:r>
-            <a:r>
-              <a:rPr lang="en-GB" dirty="0"/>
-              <a:t> </a:t>
-            </a:r>
-            <a:r>
-              <a:rPr lang="en-GB" dirty="0" err="1"/>
-              <a:t>točk</a:t>
-            </a:r>
-            <a:endParaRPr lang="en-GB" dirty="0"/>
-          </a:p>
-        </p:txBody>
-      </p:sp>
-      <p:sp>
-        <p:nvSpPr>
-          <p:cNvPr id="3" name="Content Placeholder 2">
-            <a:extLst>
-              <a:ext uri="{FF2B5EF4-FFF2-40B4-BE49-F238E27FC236}">
-                <a16:creationId xmlns:a16="http://schemas.microsoft.com/office/drawing/2014/main" id="{D45FCF20-91D5-47B4-82F1-712AD67B5261}"/>
-              </a:ext>
-            </a:extLst>
-          </p:cNvPr>
-          <p:cNvSpPr>
-            <a:spLocks noGrp="1"/>
-          </p:cNvSpPr>
-          <p:nvPr>
-            <p:ph idx="1"/>
-          </p:nvPr>
-        </p:nvSpPr>
-        <p:spPr/>
-        <p:txBody>
-          <a:bodyPr/>
-          <a:lstStyle/>
-          <a:p>
-            <a:endParaRPr lang="en-GB"/>
-          </a:p>
-        </p:txBody>
-      </p:sp>
+      <p:pic>
+        <p:nvPicPr>
+          <p:cNvPr id="5" name="Picture 4">
+            <a:extLst>
+              <a:ext uri="{FF2B5EF4-FFF2-40B4-BE49-F238E27FC236}">
+                <a16:creationId xmlns:a16="http://schemas.microsoft.com/office/drawing/2014/main" id="{93E7FD49-3F7E-4E08-AEB3-9743E79466A6}"/>
+              </a:ext>
+            </a:extLst>
+          </p:cNvPr>
+          <p:cNvPicPr>
+            <a:picLocks noChangeAspect="1"/>
+          </p:cNvPicPr>
+          <p:nvPr/>
+        </p:nvPicPr>
+        <p:blipFill>
+          <a:blip r:embed="rId2">
+            <a:extLst>
+              <a:ext uri="{28A0092B-C50C-407E-A947-70E740481C1C}">
+                <a14:useLocalDpi xmlns:a14="http://schemas.microsoft.com/office/drawing/2010/main" val="0"/>
+              </a:ext>
+            </a:extLst>
+          </a:blip>
+          <a:stretch>
+            <a:fillRect/>
+          </a:stretch>
+        </p:blipFill>
+        <p:spPr>
+          <a:xfrm>
+            <a:off x="1596000" y="54000"/>
+            <a:ext cx="9000000" cy="6750000"/>
+          </a:xfrm>
+          <a:prstGeom prst="rect">
+            <a:avLst/>
+          </a:prstGeom>
+        </p:spPr>
+      </p:pic>
+      <p:pic>
+        <p:nvPicPr>
+          <p:cNvPr id="7" name="Picture 6">
+            <a:extLst>
+              <a:ext uri="{FF2B5EF4-FFF2-40B4-BE49-F238E27FC236}">
+                <a16:creationId xmlns:a16="http://schemas.microsoft.com/office/drawing/2014/main" id="{FB354950-1BD7-4AA1-B3F2-B47BF510FCEF}"/>
+              </a:ext>
+            </a:extLst>
+          </p:cNvPr>
+          <p:cNvPicPr>
+            <a:picLocks noChangeAspect="1"/>
+          </p:cNvPicPr>
+          <p:nvPr/>
+        </p:nvPicPr>
+        <p:blipFill>
+          <a:blip r:embed="rId3">
+            <a:extLst>
+              <a:ext uri="{28A0092B-C50C-407E-A947-70E740481C1C}">
+                <a14:useLocalDpi xmlns:a14="http://schemas.microsoft.com/office/drawing/2010/main" val="0"/>
+              </a:ext>
+            </a:extLst>
+          </a:blip>
+          <a:stretch>
+            <a:fillRect/>
+          </a:stretch>
+        </p:blipFill>
+        <p:spPr>
+          <a:xfrm>
+            <a:off x="1596000" y="54000"/>
+            <a:ext cx="9000000" cy="6750000"/>
+          </a:xfrm>
+          <a:prstGeom prst="rect">
+            <a:avLst/>
+          </a:prstGeom>
+        </p:spPr>
+      </p:pic>
+      <p:pic>
+        <p:nvPicPr>
+          <p:cNvPr id="9" name="Picture 8">
+            <a:extLst>
+              <a:ext uri="{FF2B5EF4-FFF2-40B4-BE49-F238E27FC236}">
+                <a16:creationId xmlns:a16="http://schemas.microsoft.com/office/drawing/2014/main" id="{9710D7CB-BC2D-4EE8-B544-93D6EA58DC63}"/>
+              </a:ext>
+            </a:extLst>
+          </p:cNvPr>
+          <p:cNvPicPr>
+            <a:picLocks noChangeAspect="1"/>
+          </p:cNvPicPr>
+          <p:nvPr/>
+        </p:nvPicPr>
+        <p:blipFill>
+          <a:blip r:embed="rId4">
+            <a:extLst>
+              <a:ext uri="{28A0092B-C50C-407E-A947-70E740481C1C}">
+                <a14:useLocalDpi xmlns:a14="http://schemas.microsoft.com/office/drawing/2010/main" val="0"/>
+              </a:ext>
+            </a:extLst>
+          </a:blip>
+          <a:stretch>
+            <a:fillRect/>
+          </a:stretch>
+        </p:blipFill>
+        <p:spPr>
+          <a:xfrm>
+            <a:off x="1596000" y="54000"/>
+            <a:ext cx="9000000" cy="6750000"/>
+          </a:xfrm>
+          <a:prstGeom prst="rect">
+            <a:avLst/>
+          </a:prstGeom>
+        </p:spPr>
+      </p:pic>
+      <p:pic>
+        <p:nvPicPr>
+          <p:cNvPr id="11" name="Picture 10">
+            <a:extLst>
+              <a:ext uri="{FF2B5EF4-FFF2-40B4-BE49-F238E27FC236}">
+                <a16:creationId xmlns:a16="http://schemas.microsoft.com/office/drawing/2014/main" id="{DFC2524D-6EBF-46E3-9F10-FE2F76CB523C}"/>
+              </a:ext>
+            </a:extLst>
+          </p:cNvPr>
+          <p:cNvPicPr>
+            <a:picLocks noChangeAspect="1"/>
+          </p:cNvPicPr>
+          <p:nvPr/>
+        </p:nvPicPr>
+        <p:blipFill>
+          <a:blip r:embed="rId5">
+            <a:extLst>
+              <a:ext uri="{28A0092B-C50C-407E-A947-70E740481C1C}">
+                <a14:useLocalDpi xmlns:a14="http://schemas.microsoft.com/office/drawing/2010/main" val="0"/>
+              </a:ext>
+            </a:extLst>
+          </a:blip>
+          <a:stretch>
+            <a:fillRect/>
+          </a:stretch>
+        </p:blipFill>
+        <p:spPr>
+          <a:xfrm>
+            <a:off x="1596000" y="54000"/>
+            <a:ext cx="9000000" cy="6750000"/>
+          </a:xfrm>
+          <a:prstGeom prst="rect">
+            <a:avLst/>
+          </a:prstGeom>
+        </p:spPr>
+      </p:pic>
+      <p:pic>
+        <p:nvPicPr>
+          <p:cNvPr id="13" name="Picture 12">
+            <a:extLst>
+              <a:ext uri="{FF2B5EF4-FFF2-40B4-BE49-F238E27FC236}">
+                <a16:creationId xmlns:a16="http://schemas.microsoft.com/office/drawing/2014/main" id="{68A43413-38FA-4598-BF87-D37FDA04183D}"/>
+              </a:ext>
+            </a:extLst>
+          </p:cNvPr>
+          <p:cNvPicPr>
+            <a:picLocks noChangeAspect="1"/>
+          </p:cNvPicPr>
+          <p:nvPr/>
+        </p:nvPicPr>
+        <p:blipFill>
+          <a:blip r:embed="rId6">
+            <a:extLst>
+              <a:ext uri="{28A0092B-C50C-407E-A947-70E740481C1C}">
+                <a14:useLocalDpi xmlns:a14="http://schemas.microsoft.com/office/drawing/2010/main" val="0"/>
+              </a:ext>
+            </a:extLst>
+          </a:blip>
+          <a:stretch>
+            <a:fillRect/>
+          </a:stretch>
+        </p:blipFill>
+        <p:spPr>
+          <a:xfrm>
+            <a:off x="1596000" y="54000"/>
+            <a:ext cx="9000000" cy="6750000"/>
+          </a:xfrm>
+          <a:prstGeom prst="rect">
+            <a:avLst/>
+          </a:prstGeom>
+        </p:spPr>
+      </p:pic>
     </p:spTree>
     <p:extLst>
       <p:ext uri="{BB962C8B-B14F-4D97-AF65-F5344CB8AC3E}">
-        <p14:creationId xmlns:p14="http://schemas.microsoft.com/office/powerpoint/2010/main" val="2975574081"/>
+        <p14:creationId xmlns:p14="http://schemas.microsoft.com/office/powerpoint/2010/main" val="2144315058"/>
       </p:ext>
     </p:extLst>
   </p:cSld>
   <p:clrMapOvr>
     <a:masterClrMapping/>
   </p:clrMapOvr>
+  <p:timing>
+    <p:tnLst>
+      <p:par>
+        <p:cTn id="1" dur="indefinite" restart="never" nodeType="tmRoot">
+          <p:childTnLst>
+            <p:seq concurrent="1" nextAc="seek">
+              <p:cTn id="2" dur="indefinite" nodeType="mainSeq">
+                <p:childTnLst>
+                  <p:par>
+                    <p:cTn id="3" fill="hold">
+                      <p:stCondLst>
+                        <p:cond delay="indefinite"/>
+                      </p:stCondLst>
+                      <p:childTnLst>
+                        <p:par>
+                          <p:cTn id="4" fill="hold">
+                            <p:stCondLst>
+                              <p:cond delay="0"/>
+                            </p:stCondLst>
+                            <p:childTnLst>
+                              <p:par>
+                                <p:cTn id="5" presetID="1" presetClass="entr" presetSubtype="0" fill="hold" nodeType="clickEffect">
+                                  <p:stCondLst>
+                                    <p:cond delay="0"/>
+                                  </p:stCondLst>
+                                  <p:childTnLst>
+                                    <p:set>
+                                      <p:cBhvr>
+                                        <p:cTn id="6" dur="1" fill="hold">
+                                          <p:stCondLst>
+                                            <p:cond delay="0"/>
+                                          </p:stCondLst>
+                                        </p:cTn>
+                                        <p:tgtEl>
+                                          <p:spTgt spid="7"/>
+                                        </p:tgtEl>
+                                        <p:attrNameLst>
+                                          <p:attrName>style.visibility</p:attrName>
+                                        </p:attrNameLst>
+                                      </p:cBhvr>
+                                      <p:to>
+                                        <p:strVal val="visible"/>
+                                      </p:to>
+                                    </p:set>
+                                  </p:childTnLst>
+                                </p:cTn>
+                              </p:par>
+                            </p:childTnLst>
+                          </p:cTn>
+                        </p:par>
+                      </p:childTnLst>
+                    </p:cTn>
+                  </p:par>
+                  <p:par>
+                    <p:cTn id="7" fill="hold">
+                      <p:stCondLst>
+                        <p:cond delay="indefinite"/>
+                      </p:stCondLst>
+                      <p:childTnLst>
+                        <p:par>
+                          <p:cTn id="8" fill="hold">
+                            <p:stCondLst>
+                              <p:cond delay="0"/>
+                            </p:stCondLst>
+                            <p:childTnLst>
+                              <p:par>
+                                <p:cTn id="9" presetID="1" presetClass="entr" presetSubtype="0" fill="hold" nodeType="clickEffect">
+                                  <p:stCondLst>
+                                    <p:cond delay="0"/>
+                                  </p:stCondLst>
+                                  <p:childTnLst>
+                                    <p:set>
+                                      <p:cBhvr>
+                                        <p:cTn id="10" dur="1" fill="hold">
+                                          <p:stCondLst>
+                                            <p:cond delay="0"/>
+                                          </p:stCondLst>
+                                        </p:cTn>
+                                        <p:tgtEl>
+                                          <p:spTgt spid="9"/>
+                                        </p:tgtEl>
+                                        <p:attrNameLst>
+                                          <p:attrName>style.visibility</p:attrName>
+                                        </p:attrNameLst>
+                                      </p:cBhvr>
+                                      <p:to>
+                                        <p:strVal val="visible"/>
+                                      </p:to>
+                                    </p:set>
+                                  </p:childTnLst>
+                                </p:cTn>
+                              </p:par>
+                            </p:childTnLst>
+                          </p:cTn>
+                        </p:par>
+                      </p:childTnLst>
+                    </p:cTn>
+                  </p:par>
+                  <p:par>
+                    <p:cTn id="11" fill="hold">
+                      <p:stCondLst>
+                        <p:cond delay="indefinite"/>
+                      </p:stCondLst>
+                      <p:childTnLst>
+                        <p:par>
+                          <p:cTn id="12" fill="hold">
+                            <p:stCondLst>
+                              <p:cond delay="0"/>
+                            </p:stCondLst>
+                            <p:childTnLst>
+                              <p:par>
+                                <p:cTn id="13" presetID="1" presetClass="entr" presetSubtype="0" fill="hold" nodeType="clickEffect">
+                                  <p:stCondLst>
+                                    <p:cond delay="0"/>
+                                  </p:stCondLst>
+                                  <p:childTnLst>
+                                    <p:set>
+                                      <p:cBhvr>
+                                        <p:cTn id="14" dur="1" fill="hold">
+                                          <p:stCondLst>
+                                            <p:cond delay="0"/>
+                                          </p:stCondLst>
+                                        </p:cTn>
+                                        <p:tgtEl>
+                                          <p:spTgt spid="11"/>
+                                        </p:tgtEl>
+                                        <p:attrNameLst>
+                                          <p:attrName>style.visibility</p:attrName>
+                                        </p:attrNameLst>
+                                      </p:cBhvr>
+                                      <p:to>
+                                        <p:strVal val="visible"/>
+                                      </p:to>
+                                    </p:set>
+                                  </p:childTnLst>
+                                </p:cTn>
+                              </p:par>
+                            </p:childTnLst>
+                          </p:cTn>
+                        </p:par>
+                      </p:childTnLst>
+                    </p:cTn>
+                  </p:par>
+                  <p:par>
+                    <p:cTn id="15" fill="hold">
+                      <p:stCondLst>
+                        <p:cond delay="indefinite"/>
+                      </p:stCondLst>
+                      <p:childTnLst>
+                        <p:par>
+                          <p:cTn id="16" fill="hold">
+                            <p:stCondLst>
+                              <p:cond delay="0"/>
+                            </p:stCondLst>
+                            <p:childTnLst>
+                              <p:par>
+                                <p:cTn id="17" presetID="1" presetClass="entr" presetSubtype="0" fill="hold" nodeType="clickEffect">
+                                  <p:stCondLst>
+                                    <p:cond delay="0"/>
+                                  </p:stCondLst>
+                                  <p:childTnLst>
+                                    <p:set>
+                                      <p:cBhvr>
+                                        <p:cTn id="18" dur="1" fill="hold">
+                                          <p:stCondLst>
+                                            <p:cond delay="0"/>
+                                          </p:stCondLst>
+                                        </p:cTn>
+                                        <p:tgtEl>
+                                          <p:spTgt spid="13"/>
+                                        </p:tgtEl>
+                                        <p:attrNameLst>
+                                          <p:attrName>style.visibility</p:attrName>
+                                        </p:attrNameLst>
+                                      </p:cBhvr>
+                                      <p:to>
+                                        <p:strVal val="visible"/>
+                                      </p:to>
+                                    </p:set>
+                                  </p:childTnLst>
+                                </p:cTn>
+                              </p:par>
+                            </p:childTnLst>
+                          </p:cTn>
+                        </p:par>
+                      </p:childTnLst>
+                    </p:cTn>
+                  </p:par>
+                </p:childTnLst>
+              </p:cTn>
+              <p:prevCondLst>
+                <p:cond evt="onPrev" delay="0">
+                  <p:tgtEl>
+                    <p:sldTgt/>
+                  </p:tgtEl>
+                </p:cond>
+              </p:prevCondLst>
+              <p:nextCondLst>
+                <p:cond evt="onNext" delay="0">
+                  <p:tgtEl>
+                    <p:sldTgt/>
+                  </p:tgtEl>
+                </p:cond>
+              </p:nextCondLst>
+            </p:seq>
+          </p:childTnLst>
+        </p:cTn>
+      </p:par>
+    </p:tnLst>
+  </p:timing>
 </p:sld>
 </file>
 
@@ -4359,7 +7892,7 @@
           <p:cNvPr id="2" name="Title 1">
             <a:extLst>
               <a:ext uri="{FF2B5EF4-FFF2-40B4-BE49-F238E27FC236}">
-                <a16:creationId xmlns:a16="http://schemas.microsoft.com/office/drawing/2014/main" id="{AF637770-BFFA-499F-A743-11013ABC97EF}"/>
+                <a16:creationId xmlns:a16="http://schemas.microsoft.com/office/drawing/2014/main" id="{418ACE3E-39EB-4B4F-9849-EB41EE3C66A1}"/>
               </a:ext>
             </a:extLst>
           </p:cNvPr>
@@ -4377,17 +7910,20 @@
           <a:p>
             <a:r>
               <a:rPr lang="en-GB" dirty="0" err="1"/>
-              <a:t>Primeri</a:t>
+              <a:t>Verzije</a:t>
             </a:r>
             <a:r>
               <a:rPr lang="en-GB" dirty="0"/>
-              <a:t> in </a:t>
+              <a:t> jump flood </a:t>
             </a:r>
             <a:r>
               <a:rPr lang="en-GB" dirty="0" err="1"/>
-              <a:t>zanimivosto</a:t>
-            </a:r>
-            <a:endParaRPr lang="en-GB" dirty="0"/>
+              <a:t>algoritma</a:t>
+            </a:r>
+            <a:r>
+              <a:rPr lang="en-GB" dirty="0"/>
+              <a:t> (JFA)</a:t>
+            </a:r>
           </a:p>
         </p:txBody>
       </p:sp>
@@ -4396,7 +7932,7 @@
           <p:cNvPr id="3" name="Content Placeholder 2">
             <a:extLst>
               <a:ext uri="{FF2B5EF4-FFF2-40B4-BE49-F238E27FC236}">
-                <a16:creationId xmlns:a16="http://schemas.microsoft.com/office/drawing/2014/main" id="{5306AC4C-D1DD-44AE-A954-698F27024FC7}"/>
+                <a16:creationId xmlns:a16="http://schemas.microsoft.com/office/drawing/2014/main" id="{5E2C260F-58D6-48D2-BF72-A8ED1287AC70}"/>
               </a:ext>
             </a:extLst>
           </p:cNvPr>
@@ -4407,25 +7943,418 @@
             <p:ph idx="1"/>
           </p:nvPr>
         </p:nvSpPr>
-        <p:spPr/>
+        <p:spPr>
+          <a:xfrm>
+            <a:off x="838200" y="1852258"/>
+            <a:ext cx="10515600" cy="4351338"/>
+          </a:xfrm>
+        </p:spPr>
         <p:txBody>
           <a:bodyPr/>
           <a:lstStyle/>
           <a:p>
-            <a:endParaRPr lang="en-GB"/>
+            <a:r>
+              <a:rPr lang="en-GB" dirty="0" err="1"/>
+              <a:t>Napake</a:t>
+            </a:r>
+            <a:r>
+              <a:rPr lang="en-GB" dirty="0"/>
+              <a:t>, ki so </a:t>
+            </a:r>
+            <a:r>
+              <a:rPr lang="en-GB" dirty="0" err="1"/>
+              <a:t>zanemarljive</a:t>
+            </a:r>
+            <a:endParaRPr lang="en-GB" dirty="0"/>
+          </a:p>
+          <a:p>
+            <a:endParaRPr lang="en-GB" dirty="0"/>
+          </a:p>
+          <a:p>
+            <a:endParaRPr lang="en-GB" dirty="0"/>
+          </a:p>
+          <a:p>
+            <a:r>
+              <a:rPr lang="en-GB" dirty="0"/>
+              <a:t>JFA + 1 : {N/2, N/4, …, 1, 1}</a:t>
+            </a:r>
+          </a:p>
+          <a:p>
+            <a:r>
+              <a:rPr lang="en-GB" dirty="0"/>
+              <a:t>JFA + 2 : {N/2, N/4, …, 1, 2, 1}</a:t>
+            </a:r>
+          </a:p>
+          <a:p>
+            <a:r>
+              <a:rPr lang="en-GB" dirty="0"/>
+              <a:t>1 + JFA : {1, N/2, N/4, …, 1}</a:t>
+            </a:r>
+          </a:p>
+          <a:p>
+            <a:endParaRPr lang="en-GB" dirty="0"/>
+          </a:p>
+          <a:p>
+            <a:endParaRPr lang="en-GB" dirty="0"/>
+          </a:p>
+          <a:p>
+            <a:endParaRPr lang="en-GB" dirty="0"/>
+          </a:p>
+        </p:txBody>
+      </p:sp>
+      <p:pic>
+        <p:nvPicPr>
+          <p:cNvPr id="5" name="Picture 4" descr="Chart&#10;&#10;Description automatically generated">
+            <a:extLst>
+              <a:ext uri="{FF2B5EF4-FFF2-40B4-BE49-F238E27FC236}">
+                <a16:creationId xmlns:a16="http://schemas.microsoft.com/office/drawing/2014/main" id="{98159E0E-56F8-4D09-9C43-1FC7A9CECC8C}"/>
+              </a:ext>
+            </a:extLst>
+          </p:cNvPr>
+          <p:cNvPicPr>
+            <a:picLocks noChangeAspect="1"/>
+          </p:cNvPicPr>
+          <p:nvPr/>
+        </p:nvPicPr>
+        <p:blipFill>
+          <a:blip r:embed="rId2"/>
+          <a:stretch>
+            <a:fillRect/>
+          </a:stretch>
+        </p:blipFill>
+        <p:spPr>
+          <a:xfrm>
+            <a:off x="5536845" y="1717321"/>
+            <a:ext cx="6066269" cy="4343305"/>
+          </a:xfrm>
+          <a:prstGeom prst="rect">
+            <a:avLst/>
+          </a:prstGeom>
+        </p:spPr>
+      </p:pic>
+      <p:sp>
+        <p:nvSpPr>
+          <p:cNvPr id="6" name="TextBox 5">
+            <a:extLst>
+              <a:ext uri="{FF2B5EF4-FFF2-40B4-BE49-F238E27FC236}">
+                <a16:creationId xmlns:a16="http://schemas.microsoft.com/office/drawing/2014/main" id="{86D9245F-1820-4F67-B073-9313CCDE2C55}"/>
+              </a:ext>
+            </a:extLst>
+          </p:cNvPr>
+          <p:cNvSpPr txBox="1"/>
+          <p:nvPr/>
+        </p:nvSpPr>
+        <p:spPr>
+          <a:xfrm>
+            <a:off x="6232124" y="5949667"/>
+            <a:ext cx="5370990" cy="830997"/>
+          </a:xfrm>
+          <a:prstGeom prst="rect">
+            <a:avLst/>
+          </a:prstGeom>
+          <a:noFill/>
+        </p:spPr>
+        <p:txBody>
+          <a:bodyPr wrap="square" rtlCol="0">
+            <a:spAutoFit/>
+          </a:bodyPr>
+          <a:lstStyle/>
+          <a:p>
+            <a:r>
+              <a:rPr lang="en-GB" sz="1200" dirty="0"/>
+              <a:t>Graf </a:t>
+            </a:r>
+            <a:r>
+              <a:rPr lang="en-GB" sz="1200" dirty="0" err="1"/>
+              <a:t>dostopen</a:t>
+            </a:r>
+            <a:r>
+              <a:rPr lang="en-GB" sz="1200" dirty="0"/>
+              <a:t> </a:t>
+            </a:r>
+            <a:r>
+              <a:rPr lang="en-GB" sz="1200" dirty="0" err="1"/>
+              <a:t>na</a:t>
+            </a:r>
+            <a:r>
+              <a:rPr lang="en-GB" sz="1200" dirty="0"/>
+              <a:t>: </a:t>
+            </a:r>
+            <a:r>
+              <a:rPr lang="en-GB" sz="1200" dirty="0">
+                <a:hlinkClick r:id="rId3"/>
+              </a:rPr>
+              <a:t>https://www.researchgate.net/publication/4263565_Variants_of_Jump_Flooding_Algorithm_for_Computing_Discrete_Voronoi_Diagrams</a:t>
+            </a:r>
+            <a:endParaRPr lang="en-GB" sz="1200" dirty="0"/>
+          </a:p>
+          <a:p>
+            <a:endParaRPr lang="en-GB" sz="1200" dirty="0"/>
           </a:p>
         </p:txBody>
       </p:sp>
     </p:spTree>
     <p:extLst>
       <p:ext uri="{BB962C8B-B14F-4D97-AF65-F5344CB8AC3E}">
-        <p14:creationId xmlns:p14="http://schemas.microsoft.com/office/powerpoint/2010/main" val="3838925735"/>
+        <p14:creationId xmlns:p14="http://schemas.microsoft.com/office/powerpoint/2010/main" val="255822959"/>
       </p:ext>
     </p:extLst>
   </p:cSld>
   <p:clrMapOvr>
     <a:masterClrMapping/>
   </p:clrMapOvr>
+  <p:timing>
+    <p:tnLst>
+      <p:par>
+        <p:cTn id="1" dur="indefinite" restart="never" nodeType="tmRoot">
+          <p:childTnLst>
+            <p:seq concurrent="1" nextAc="seek">
+              <p:cTn id="2" dur="indefinite" nodeType="mainSeq">
+                <p:childTnLst>
+                  <p:par>
+                    <p:cTn id="3" fill="hold">
+                      <p:stCondLst>
+                        <p:cond delay="indefinite"/>
+                      </p:stCondLst>
+                      <p:childTnLst>
+                        <p:par>
+                          <p:cTn id="4" fill="hold">
+                            <p:stCondLst>
+                              <p:cond delay="0"/>
+                            </p:stCondLst>
+                            <p:childTnLst>
+                              <p:par>
+                                <p:cTn id="5" presetID="1" presetClass="entr" presetSubtype="0" fill="hold" nodeType="clickEffect">
+                                  <p:stCondLst>
+                                    <p:cond delay="0"/>
+                                  </p:stCondLst>
+                                  <p:childTnLst>
+                                    <p:set>
+                                      <p:cBhvr>
+                                        <p:cTn id="6" dur="1" fill="hold">
+                                          <p:stCondLst>
+                                            <p:cond delay="0"/>
+                                          </p:stCondLst>
+                                        </p:cTn>
+                                        <p:tgtEl>
+                                          <p:spTgt spid="3">
+                                            <p:txEl>
+                                              <p:pRg st="3" end="3"/>
+                                            </p:txEl>
+                                          </p:spTgt>
+                                        </p:tgtEl>
+                                        <p:attrNameLst>
+                                          <p:attrName>style.visibility</p:attrName>
+                                        </p:attrNameLst>
+                                      </p:cBhvr>
+                                      <p:to>
+                                        <p:strVal val="visible"/>
+                                      </p:to>
+                                    </p:set>
+                                  </p:childTnLst>
+                                </p:cTn>
+                              </p:par>
+                            </p:childTnLst>
+                          </p:cTn>
+                        </p:par>
+                      </p:childTnLst>
+                    </p:cTn>
+                  </p:par>
+                  <p:par>
+                    <p:cTn id="7" fill="hold">
+                      <p:stCondLst>
+                        <p:cond delay="indefinite"/>
+                      </p:stCondLst>
+                      <p:childTnLst>
+                        <p:par>
+                          <p:cTn id="8" fill="hold">
+                            <p:stCondLst>
+                              <p:cond delay="0"/>
+                            </p:stCondLst>
+                            <p:childTnLst>
+                              <p:par>
+                                <p:cTn id="9" presetID="1" presetClass="entr" presetSubtype="0" fill="hold" nodeType="clickEffect">
+                                  <p:stCondLst>
+                                    <p:cond delay="0"/>
+                                  </p:stCondLst>
+                                  <p:childTnLst>
+                                    <p:set>
+                                      <p:cBhvr>
+                                        <p:cTn id="10" dur="1" fill="hold">
+                                          <p:stCondLst>
+                                            <p:cond delay="0"/>
+                                          </p:stCondLst>
+                                        </p:cTn>
+                                        <p:tgtEl>
+                                          <p:spTgt spid="3">
+                                            <p:txEl>
+                                              <p:pRg st="4" end="4"/>
+                                            </p:txEl>
+                                          </p:spTgt>
+                                        </p:tgtEl>
+                                        <p:attrNameLst>
+                                          <p:attrName>style.visibility</p:attrName>
+                                        </p:attrNameLst>
+                                      </p:cBhvr>
+                                      <p:to>
+                                        <p:strVal val="visible"/>
+                                      </p:to>
+                                    </p:set>
+                                  </p:childTnLst>
+                                </p:cTn>
+                              </p:par>
+                            </p:childTnLst>
+                          </p:cTn>
+                        </p:par>
+                      </p:childTnLst>
+                    </p:cTn>
+                  </p:par>
+                  <p:par>
+                    <p:cTn id="11" fill="hold">
+                      <p:stCondLst>
+                        <p:cond delay="indefinite"/>
+                      </p:stCondLst>
+                      <p:childTnLst>
+                        <p:par>
+                          <p:cTn id="12" fill="hold">
+                            <p:stCondLst>
+                              <p:cond delay="0"/>
+                            </p:stCondLst>
+                            <p:childTnLst>
+                              <p:par>
+                                <p:cTn id="13" presetID="1" presetClass="entr" presetSubtype="0" fill="hold" nodeType="clickEffect">
+                                  <p:stCondLst>
+                                    <p:cond delay="0"/>
+                                  </p:stCondLst>
+                                  <p:childTnLst>
+                                    <p:set>
+                                      <p:cBhvr>
+                                        <p:cTn id="14" dur="1" fill="hold">
+                                          <p:stCondLst>
+                                            <p:cond delay="0"/>
+                                          </p:stCondLst>
+                                        </p:cTn>
+                                        <p:tgtEl>
+                                          <p:spTgt spid="3">
+                                            <p:txEl>
+                                              <p:pRg st="5" end="5"/>
+                                            </p:txEl>
+                                          </p:spTgt>
+                                        </p:tgtEl>
+                                        <p:attrNameLst>
+                                          <p:attrName>style.visibility</p:attrName>
+                                        </p:attrNameLst>
+                                      </p:cBhvr>
+                                      <p:to>
+                                        <p:strVal val="visible"/>
+                                      </p:to>
+                                    </p:set>
+                                  </p:childTnLst>
+                                </p:cTn>
+                              </p:par>
+                            </p:childTnLst>
+                          </p:cTn>
+                        </p:par>
+                      </p:childTnLst>
+                    </p:cTn>
+                  </p:par>
+                  <p:par>
+                    <p:cTn id="15" fill="hold">
+                      <p:stCondLst>
+                        <p:cond delay="indefinite"/>
+                      </p:stCondLst>
+                      <p:childTnLst>
+                        <p:par>
+                          <p:cTn id="16" fill="hold">
+                            <p:stCondLst>
+                              <p:cond delay="0"/>
+                            </p:stCondLst>
+                            <p:childTnLst>
+                              <p:par>
+                                <p:cTn id="17" presetID="1" presetClass="entr" presetSubtype="0" fill="hold" nodeType="clickEffect">
+                                  <p:stCondLst>
+                                    <p:cond delay="0"/>
+                                  </p:stCondLst>
+                                  <p:childTnLst>
+                                    <p:set>
+                                      <p:cBhvr>
+                                        <p:cTn id="18" dur="1" fill="hold">
+                                          <p:stCondLst>
+                                            <p:cond delay="0"/>
+                                          </p:stCondLst>
+                                        </p:cTn>
+                                        <p:tgtEl>
+                                          <p:spTgt spid="5"/>
+                                        </p:tgtEl>
+                                        <p:attrNameLst>
+                                          <p:attrName>style.visibility</p:attrName>
+                                        </p:attrNameLst>
+                                      </p:cBhvr>
+                                      <p:to>
+                                        <p:strVal val="visible"/>
+                                      </p:to>
+                                    </p:set>
+                                  </p:childTnLst>
+                                </p:cTn>
+                              </p:par>
+                              <p:par>
+                                <p:cTn id="19" presetID="1" presetClass="entr" presetSubtype="0" fill="hold" grpId="0" nodeType="withEffect">
+                                  <p:stCondLst>
+                                    <p:cond delay="0"/>
+                                  </p:stCondLst>
+                                  <p:childTnLst>
+                                    <p:set>
+                                      <p:cBhvr>
+                                        <p:cTn id="20" dur="1" fill="hold">
+                                          <p:stCondLst>
+                                            <p:cond delay="0"/>
+                                          </p:stCondLst>
+                                        </p:cTn>
+                                        <p:tgtEl>
+                                          <p:spTgt spid="6"/>
+                                        </p:tgtEl>
+                                        <p:attrNameLst>
+                                          <p:attrName>style.visibility</p:attrName>
+                                        </p:attrNameLst>
+                                      </p:cBhvr>
+                                      <p:to>
+                                        <p:strVal val="visible"/>
+                                      </p:to>
+                                    </p:set>
+                                  </p:childTnLst>
+                                </p:cTn>
+                              </p:par>
+                            </p:childTnLst>
+                          </p:cTn>
+                        </p:par>
+                      </p:childTnLst>
+                    </p:cTn>
+                  </p:par>
+                </p:childTnLst>
+              </p:cTn>
+              <p:prevCondLst>
+                <p:cond evt="onPrev" delay="0">
+                  <p:tgtEl>
+                    <p:sldTgt/>
+                  </p:tgtEl>
+                </p:cond>
+              </p:prevCondLst>
+              <p:nextCondLst>
+                <p:cond evt="onNext" delay="0">
+                  <p:tgtEl>
+                    <p:sldTgt/>
+                  </p:tgtEl>
+                </p:cond>
+              </p:nextCondLst>
+            </p:seq>
+          </p:childTnLst>
+        </p:cTn>
+      </p:par>
+    </p:tnLst>
+    <p:bldLst>
+      <p:bldP spid="6" grpId="0"/>
+    </p:bldLst>
+  </p:timing>
 </p:sld>
 </file>
 

</xml_diff>